<commit_message>
added Day 8 supporting materials
</commit_message>
<xml_diff>
--- a/Day 7/Slides/14. Building, Testing, and Deploying with the CLI/building-testing-and-deploying-with-the-cli-slides.pptx
+++ b/Day 7/Slides/14. Building, Testing, and Deploying with the CLI/building-testing-and-deploying-with-the-cli-slides.pptx
@@ -5,7 +5,7 @@
     <p:sldMasterId id="2147483648" r:id="rId1"/>
   </p:sldMasterIdLst>
   <p:notesMasterIdLst>
-    <p:notesMasterId r:id="rId30"/>
+    <p:notesMasterId r:id="rId29"/>
   </p:notesMasterIdLst>
   <p:sldIdLst>
     <p:sldId id="256" r:id="rId3"/>
@@ -29,12 +29,11 @@
     <p:sldId id="278" r:id="rId21"/>
     <p:sldId id="279" r:id="rId22"/>
     <p:sldId id="280" r:id="rId23"/>
-    <p:sldId id="281" r:id="rId24"/>
-    <p:sldId id="282" r:id="rId25"/>
-    <p:sldId id="283" r:id="rId26"/>
-    <p:sldId id="270" r:id="rId27"/>
-    <p:sldId id="271" r:id="rId28"/>
-    <p:sldId id="273" r:id="rId29"/>
+    <p:sldId id="282" r:id="rId24"/>
+    <p:sldId id="283" r:id="rId25"/>
+    <p:sldId id="270" r:id="rId26"/>
+    <p:sldId id="271" r:id="rId27"/>
+    <p:sldId id="273" r:id="rId28"/>
   </p:sldIdLst>
   <p:sldSz cx="18288000" cy="10287000"/>
   <p:notesSz cx="18288000" cy="10287000"/>
@@ -5503,7 +5502,7 @@
             </a:r>
             <a:r>
               <a:rPr lang="en-US">
-                <a:hlinkClick r:id="rId1" tooltip="" action="ppaction://hlinkfile"/>
+                <a:hlinkClick r:id="rId1" action="ppaction://hlinkfile"/>
               </a:rPr>
               <a:t>https://angular.io/cli/update</a:t>
             </a:r>
@@ -5801,7 +5800,7 @@
             </a:r>
             <a:r>
               <a:rPr lang="en-US">
-                <a:hlinkClick r:id="rId2" tooltip="" action="ppaction://hlinkfile"/>
+                <a:hlinkClick r:id="rId2" action="ppaction://hlinkfile"/>
               </a:rPr>
               <a:t>https://www.angularjswiki.com/angularcli/ng-add/#:~:text=ng%20add%20will%20use%20our,scaffold%20package%2Dspecific%20initialization%20code.</a:t>
             </a:r>
@@ -5906,7 +5905,7 @@
             </a:r>
             <a:r>
               <a:rPr lang="en-US">
-                <a:hlinkClick r:id="rId1" tooltip="" action="ppaction://hlinkfile"/>
+                <a:hlinkClick r:id="rId1" action="ppaction://hlinkfile"/>
               </a:rPr>
               <a:t>https://angular.io/guide/elements</a:t>
             </a:r>
@@ -6106,7 +6105,7 @@
             </a:r>
             <a:r>
               <a:rPr lang="en-US">
-                <a:hlinkClick r:id="rId1" tooltip="" action="ppaction://hlinkfile"/>
+                <a:hlinkClick r:id="rId1" action="ppaction://hlinkfile"/>
               </a:rPr>
               <a:t>https://update.angular.io/?v=9.0-14.0</a:t>
             </a:r>
@@ -6123,7 +6122,7 @@
             </a:r>
             <a:r>
               <a:rPr lang="en-US">
-                <a:hlinkClick r:id="rId2" tooltip="" action="ppaction://hlinkfile"/>
+                <a:hlinkClick r:id="rId2" action="ppaction://hlinkfile"/>
               </a:rPr>
               <a:t>https://www.educba.com/angular-material-version/</a:t>
             </a:r>
@@ -6347,7 +6346,7 @@
             </a:r>
             <a:r>
               <a:rPr lang="en-US">
-                <a:hlinkClick r:id="rId1" tooltip="" action="ppaction://hlinkfile"/>
+                <a:hlinkClick r:id="rId1" action="ppaction://hlinkfile"/>
               </a:rPr>
               <a:t>https://angular.io/guide/file-structure</a:t>
             </a:r>
@@ -6722,102 +6721,6 @@
         <p:spPr>
           <a:xfrm>
             <a:off x="3742690" y="754380"/>
-            <a:ext cx="14012545" cy="1723390"/>
-          </a:xfrm>
-        </p:spPr>
-        <p:txBody>
-          <a:bodyPr wrap="square"/>
-          <a:p>
-            <a:pPr algn="ctr"/>
-            <a:r>
-              <a:rPr lang="en-US"/>
-              <a:t>Registering a Service in previous Angular versions</a:t>
-            </a:r>
-            <a:endParaRPr lang="en-US"/>
-          </a:p>
-        </p:txBody>
-      </p:sp>
-      <p:sp>
-        <p:nvSpPr>
-          <p:cNvPr id="4" name="Slide Number Placeholder 3"/>
-          <p:cNvSpPr>
-            <a:spLocks noGrp="1"/>
-          </p:cNvSpPr>
-          <p:nvPr>
-            <p:ph type="sldNum" sz="quarter" idx="7"/>
-          </p:nvPr>
-        </p:nvSpPr>
-        <p:spPr>
-          <a:xfrm>
-            <a:off x="13167361" y="9566910"/>
-            <a:ext cx="4206240" cy="276860"/>
-          </a:xfrm>
-        </p:spPr>
-        <p:txBody>
-          <a:bodyPr/>
-          <a:p>
-            <a:fld id="{B6F15528-21DE-4FAA-801E-634DDDAF4B2B}" type="slidenum">
-              <a:rPr/>
-            </a:fld>
-            <a:endParaRPr/>
-          </a:p>
-        </p:txBody>
-      </p:sp>
-      <p:pic>
-        <p:nvPicPr>
-          <p:cNvPr id="7" name="Picture 6"/>
-          <p:cNvPicPr>
-            <a:picLocks noChangeAspect="1"/>
-          </p:cNvPicPr>
-          <p:nvPr/>
-        </p:nvPicPr>
-        <p:blipFill>
-          <a:blip r:embed="rId1"/>
-          <a:stretch>
-            <a:fillRect/>
-          </a:stretch>
-        </p:blipFill>
-        <p:spPr>
-          <a:xfrm>
-            <a:off x="4724400" y="3009900"/>
-            <a:ext cx="10845800" cy="6313170"/>
-          </a:xfrm>
-          <a:prstGeom prst="rect">
-            <a:avLst/>
-          </a:prstGeom>
-        </p:spPr>
-      </p:pic>
-    </p:spTree>
-  </p:cSld>
-  <p:clrMapOvr>
-    <a:masterClrMapping/>
-  </p:clrMapOvr>
-</p:sld>
-</file>
-
-<file path=ppt/slides/slide23.xml><?xml version="1.0" encoding="utf-8"?>
-<p:sld xmlns:a="http://schemas.openxmlformats.org/drawingml/2006/main" xmlns:r="http://schemas.openxmlformats.org/officeDocument/2006/relationships" xmlns:p="http://schemas.openxmlformats.org/presentationml/2006/main">
-  <p:cSld>
-    <p:spTree>
-      <p:nvGrpSpPr>
-        <p:cNvPr id="1" name=""/>
-        <p:cNvGrpSpPr/>
-        <p:nvPr/>
-      </p:nvGrpSpPr>
-      <p:grpSpPr/>
-      <p:sp>
-        <p:nvSpPr>
-          <p:cNvPr id="5" name="Title 4"/>
-          <p:cNvSpPr>
-            <a:spLocks noGrp="1"/>
-          </p:cNvSpPr>
-          <p:nvPr>
-            <p:ph type="title"/>
-          </p:nvPr>
-        </p:nvSpPr>
-        <p:spPr>
-          <a:xfrm>
-            <a:off x="3742690" y="754380"/>
             <a:ext cx="14012545" cy="861695"/>
           </a:xfrm>
         </p:spPr>
@@ -6891,7 +6794,7 @@
 </p:sld>
 </file>
 
-<file path=ppt/slides/slide24.xml><?xml version="1.0" encoding="utf-8"?>
+<file path=ppt/slides/slide23.xml><?xml version="1.0" encoding="utf-8"?>
 <p:sld xmlns:a="http://schemas.openxmlformats.org/drawingml/2006/main" xmlns:r="http://schemas.openxmlformats.org/officeDocument/2006/relationships" xmlns:p="http://schemas.openxmlformats.org/presentationml/2006/main">
   <p:cSld>
     <p:spTree>
@@ -7044,6 +6947,1916 @@
       <p:sp>
         <p:nvSpPr>
           <p:cNvPr id="5" name="Slide Number Placeholder 4"/>
+          <p:cNvSpPr>
+            <a:spLocks noGrp="1"/>
+          </p:cNvSpPr>
+          <p:nvPr>
+            <p:ph type="sldNum" sz="quarter" idx="7"/>
+          </p:nvPr>
+        </p:nvSpPr>
+        <p:spPr/>
+        <p:txBody>
+          <a:bodyPr/>
+          <a:p>
+            <a:fld id="{B6F15528-21DE-4FAA-801E-634DDDAF4B2B}" type="slidenum">
+              <a:rPr/>
+            </a:fld>
+            <a:endParaRPr/>
+          </a:p>
+        </p:txBody>
+      </p:sp>
+    </p:spTree>
+  </p:cSld>
+  <p:clrMapOvr>
+    <a:masterClrMapping/>
+  </p:clrMapOvr>
+</p:sld>
+</file>
+
+<file path=ppt/slides/slide24.xml><?xml version="1.0" encoding="utf-8"?>
+<p:sld xmlns:a="http://schemas.openxmlformats.org/drawingml/2006/main" xmlns:r="http://schemas.openxmlformats.org/officeDocument/2006/relationships" xmlns:p="http://schemas.openxmlformats.org/presentationml/2006/main" showMasterSp="0">
+  <p:cSld>
+    <p:spTree>
+      <p:nvGrpSpPr>
+        <p:cNvPr id="1" name=""/>
+        <p:cNvGrpSpPr/>
+        <p:nvPr/>
+      </p:nvGrpSpPr>
+      <p:grpSpPr>
+        <a:xfrm>
+          <a:off x="0" y="0"/>
+          <a:ext cx="0" cy="0"/>
+          <a:chOff x="0" y="0"/>
+          <a:chExt cx="0" cy="0"/>
+        </a:xfrm>
+      </p:grpSpPr>
+      <p:grpSp>
+        <p:nvGrpSpPr>
+          <p:cNvPr id="2" name="object 2"/>
+          <p:cNvGrpSpPr/>
+          <p:nvPr/>
+        </p:nvGrpSpPr>
+        <p:grpSpPr>
+          <a:xfrm>
+            <a:off x="0" y="0"/>
+            <a:ext cx="3657600" cy="10287000"/>
+            <a:chOff x="0" y="0"/>
+            <a:chExt cx="3657600" cy="10287000"/>
+          </a:xfrm>
+        </p:grpSpPr>
+        <p:sp>
+          <p:nvSpPr>
+            <p:cNvPr id="3" name="object 3"/>
+            <p:cNvSpPr/>
+            <p:nvPr/>
+          </p:nvSpPr>
+          <p:spPr>
+            <a:xfrm>
+              <a:off x="0" y="0"/>
+              <a:ext cx="3657600" cy="10287000"/>
+            </a:xfrm>
+            <a:custGeom>
+              <a:avLst/>
+              <a:gdLst/>
+              <a:ahLst/>
+              <a:cxnLst/>
+              <a:rect l="l" t="t" r="r" b="b"/>
+              <a:pathLst>
+                <a:path w="3657600" h="10287000">
+                  <a:moveTo>
+                    <a:pt x="3657600" y="0"/>
+                  </a:moveTo>
+                  <a:lnTo>
+                    <a:pt x="0" y="0"/>
+                  </a:lnTo>
+                  <a:lnTo>
+                    <a:pt x="0" y="10286999"/>
+                  </a:lnTo>
+                  <a:lnTo>
+                    <a:pt x="3657600" y="10286999"/>
+                  </a:lnTo>
+                  <a:lnTo>
+                    <a:pt x="3657600" y="0"/>
+                  </a:lnTo>
+                  <a:close/>
+                </a:path>
+              </a:pathLst>
+            </a:custGeom>
+            <a:solidFill>
+              <a:srgbClr val="9BC850"/>
+            </a:solidFill>
+          </p:spPr>
+          <p:txBody>
+            <a:bodyPr wrap="square" lIns="0" tIns="0" rIns="0" bIns="0" rtlCol="0"/>
+            <a:lstStyle/>
+            <a:p/>
+          </p:txBody>
+        </p:sp>
+        <p:sp>
+          <p:nvSpPr>
+            <p:cNvPr id="4" name="object 4"/>
+            <p:cNvSpPr/>
+            <p:nvPr/>
+          </p:nvSpPr>
+          <p:spPr>
+            <a:xfrm>
+              <a:off x="320736" y="4016010"/>
+              <a:ext cx="2689225" cy="2255520"/>
+            </a:xfrm>
+            <a:custGeom>
+              <a:avLst/>
+              <a:gdLst/>
+              <a:ahLst/>
+              <a:cxnLst/>
+              <a:rect l="l" t="t" r="r" b="b"/>
+              <a:pathLst>
+                <a:path w="2689225" h="2255520">
+                  <a:moveTo>
+                    <a:pt x="2688950" y="0"/>
+                  </a:moveTo>
+                  <a:lnTo>
+                    <a:pt x="0" y="0"/>
+                  </a:lnTo>
+                  <a:lnTo>
+                    <a:pt x="0" y="2254977"/>
+                  </a:lnTo>
+                  <a:lnTo>
+                    <a:pt x="2688950" y="2254977"/>
+                  </a:lnTo>
+                  <a:lnTo>
+                    <a:pt x="2688950" y="0"/>
+                  </a:lnTo>
+                  <a:close/>
+                </a:path>
+              </a:pathLst>
+            </a:custGeom>
+            <a:solidFill>
+              <a:srgbClr val="FFFFFF"/>
+            </a:solidFill>
+          </p:spPr>
+          <p:txBody>
+            <a:bodyPr wrap="square" lIns="0" tIns="0" rIns="0" bIns="0" rtlCol="0"/>
+            <a:lstStyle/>
+            <a:p/>
+          </p:txBody>
+        </p:sp>
+        <p:sp>
+          <p:nvSpPr>
+            <p:cNvPr id="5" name="object 5"/>
+            <p:cNvSpPr/>
+            <p:nvPr/>
+          </p:nvSpPr>
+          <p:spPr>
+            <a:xfrm>
+              <a:off x="320736" y="4016010"/>
+              <a:ext cx="2689225" cy="2255520"/>
+            </a:xfrm>
+            <a:custGeom>
+              <a:avLst/>
+              <a:gdLst/>
+              <a:ahLst/>
+              <a:cxnLst/>
+              <a:rect l="l" t="t" r="r" b="b"/>
+              <a:pathLst>
+                <a:path w="2689225" h="2255520">
+                  <a:moveTo>
+                    <a:pt x="0" y="0"/>
+                  </a:moveTo>
+                  <a:lnTo>
+                    <a:pt x="2688951" y="0"/>
+                  </a:lnTo>
+                  <a:lnTo>
+                    <a:pt x="2688951" y="2254977"/>
+                  </a:lnTo>
+                  <a:lnTo>
+                    <a:pt x="0" y="2254977"/>
+                  </a:lnTo>
+                  <a:lnTo>
+                    <a:pt x="0" y="0"/>
+                  </a:lnTo>
+                  <a:close/>
+                </a:path>
+              </a:pathLst>
+            </a:custGeom>
+            <a:ln w="50800">
+              <a:solidFill>
+                <a:srgbClr val="9BC850"/>
+              </a:solidFill>
+            </a:ln>
+          </p:spPr>
+          <p:txBody>
+            <a:bodyPr wrap="square" lIns="0" tIns="0" rIns="0" bIns="0" rtlCol="0"/>
+            <a:lstStyle/>
+            <a:p/>
+          </p:txBody>
+        </p:sp>
+        <p:pic>
+          <p:nvPicPr>
+            <p:cNvPr id="6" name="object 6"/>
+            <p:cNvPicPr/>
+            <p:nvPr/>
+          </p:nvPicPr>
+          <p:blipFill>
+            <a:blip r:embed="rId1" cstate="print"/>
+            <a:stretch>
+              <a:fillRect/>
+            </a:stretch>
+          </p:blipFill>
+          <p:spPr>
+            <a:xfrm>
+              <a:off x="729004" y="4411124"/>
+              <a:ext cx="1872414" cy="1464749"/>
+            </a:xfrm>
+            <a:prstGeom prst="rect">
+              <a:avLst/>
+            </a:prstGeom>
+          </p:spPr>
+        </p:pic>
+      </p:grpSp>
+      <p:sp>
+        <p:nvSpPr>
+          <p:cNvPr id="7" name="object 7"/>
+          <p:cNvSpPr txBox="1">
+            <a:spLocks noGrp="1"/>
+          </p:cNvSpPr>
+          <p:nvPr>
+            <p:ph type="title"/>
+          </p:nvPr>
+        </p:nvSpPr>
+        <p:spPr>
+          <a:xfrm>
+            <a:off x="291896" y="374395"/>
+            <a:ext cx="2559685" cy="1619885"/>
+          </a:xfrm>
+          <a:prstGeom prst="rect">
+            <a:avLst/>
+          </a:prstGeom>
+        </p:spPr>
+        <p:txBody>
+          <a:bodyPr vert="horz" wrap="square" lIns="0" tIns="38100" rIns="0" bIns="0" rtlCol="0">
+            <a:spAutoFit/>
+          </a:bodyPr>
+          <a:lstStyle/>
+          <a:p>
+            <a:pPr marL="12700" marR="5080">
+              <a:lnSpc>
+                <a:spcPct val="95000"/>
+              </a:lnSpc>
+              <a:spcBef>
+                <a:spcPts val="300"/>
+              </a:spcBef>
+            </a:pPr>
+            <a:r>
+              <a:rPr sz="3600" b="1" spc="-60" dirty="0">
+                <a:solidFill>
+                  <a:srgbClr val="727272"/>
+                </a:solidFill>
+                <a:latin typeface="Arial" panose="020B0604020202020204"/>
+                <a:cs typeface="Arial" panose="020B0604020202020204"/>
+              </a:rPr>
+              <a:t>Angular</a:t>
+            </a:r>
+            <a:r>
+              <a:rPr sz="3600" b="1" spc="-130" dirty="0">
+                <a:solidFill>
+                  <a:srgbClr val="727272"/>
+                </a:solidFill>
+                <a:latin typeface="Arial" panose="020B0604020202020204"/>
+                <a:cs typeface="Arial" panose="020B0604020202020204"/>
+              </a:rPr>
+              <a:t> </a:t>
+            </a:r>
+            <a:r>
+              <a:rPr sz="3600" b="1" spc="-5" dirty="0">
+                <a:solidFill>
+                  <a:srgbClr val="727272"/>
+                </a:solidFill>
+                <a:latin typeface="Arial" panose="020B0604020202020204"/>
+                <a:cs typeface="Arial" panose="020B0604020202020204"/>
+              </a:rPr>
+              <a:t>CLI </a:t>
+            </a:r>
+            <a:r>
+              <a:rPr sz="3600" b="1" spc="-985" dirty="0">
+                <a:solidFill>
+                  <a:srgbClr val="727272"/>
+                </a:solidFill>
+                <a:latin typeface="Arial" panose="020B0604020202020204"/>
+                <a:cs typeface="Arial" panose="020B0604020202020204"/>
+              </a:rPr>
+              <a:t> </a:t>
+            </a:r>
+            <a:r>
+              <a:rPr sz="3600" b="1" spc="-40" dirty="0">
+                <a:solidFill>
+                  <a:srgbClr val="727272"/>
+                </a:solidFill>
+                <a:latin typeface="Arial" panose="020B0604020202020204"/>
+                <a:cs typeface="Arial" panose="020B0604020202020204"/>
+              </a:rPr>
+              <a:t>Checklist: </a:t>
+            </a:r>
+            <a:r>
+              <a:rPr sz="3600" b="1" spc="-35" dirty="0">
+                <a:solidFill>
+                  <a:srgbClr val="727272"/>
+                </a:solidFill>
+                <a:latin typeface="Arial" panose="020B0604020202020204"/>
+                <a:cs typeface="Arial" panose="020B0604020202020204"/>
+              </a:rPr>
+              <a:t> </a:t>
+            </a:r>
+            <a:r>
+              <a:rPr sz="3600" b="1" spc="-55" dirty="0">
+                <a:solidFill>
+                  <a:srgbClr val="FFFFFF"/>
+                </a:solidFill>
+                <a:latin typeface="Arial" panose="020B0604020202020204"/>
+                <a:cs typeface="Arial" panose="020B0604020202020204"/>
+              </a:rPr>
+              <a:t>Commands</a:t>
+            </a:r>
+            <a:endParaRPr sz="3600">
+              <a:latin typeface="Arial" panose="020B0604020202020204"/>
+              <a:cs typeface="Arial" panose="020B0604020202020204"/>
+            </a:endParaRPr>
+          </a:p>
+        </p:txBody>
+      </p:sp>
+      <p:sp>
+        <p:nvSpPr>
+          <p:cNvPr id="8" name="object 8"/>
+          <p:cNvSpPr txBox="1"/>
+          <p:nvPr/>
+        </p:nvSpPr>
+        <p:spPr>
+          <a:xfrm>
+            <a:off x="4072049" y="831595"/>
+            <a:ext cx="11957685" cy="8587740"/>
+          </a:xfrm>
+          <a:prstGeom prst="rect">
+            <a:avLst/>
+          </a:prstGeom>
+        </p:spPr>
+        <p:txBody>
+          <a:bodyPr vert="horz" wrap="square" lIns="0" tIns="12700" rIns="0" bIns="0" rtlCol="0">
+            <a:spAutoFit/>
+          </a:bodyPr>
+          <a:lstStyle/>
+          <a:p>
+            <a:pPr marL="12700">
+              <a:lnSpc>
+                <a:spcPct val="100000"/>
+              </a:lnSpc>
+              <a:spcBef>
+                <a:spcPts val="100"/>
+              </a:spcBef>
+            </a:pPr>
+            <a:r>
+              <a:rPr sz="3600" b="1" spc="-5" dirty="0">
+                <a:solidFill>
+                  <a:srgbClr val="9BC850"/>
+                </a:solidFill>
+                <a:latin typeface="Arial" panose="020B0604020202020204"/>
+                <a:cs typeface="Arial" panose="020B0604020202020204"/>
+              </a:rPr>
+              <a:t>ng</a:t>
+            </a:r>
+            <a:r>
+              <a:rPr sz="3600" b="1" spc="-75" dirty="0">
+                <a:solidFill>
+                  <a:srgbClr val="9BC850"/>
+                </a:solidFill>
+                <a:latin typeface="Arial" panose="020B0604020202020204"/>
+                <a:cs typeface="Arial" panose="020B0604020202020204"/>
+              </a:rPr>
+              <a:t> </a:t>
+            </a:r>
+            <a:r>
+              <a:rPr sz="3600" b="1" spc="15" dirty="0">
+                <a:solidFill>
+                  <a:srgbClr val="9BC850"/>
+                </a:solidFill>
+                <a:latin typeface="Arial" panose="020B0604020202020204"/>
+                <a:cs typeface="Arial" panose="020B0604020202020204"/>
+              </a:rPr>
+              <a:t>help</a:t>
+            </a:r>
+            <a:r>
+              <a:rPr sz="3600" b="1" spc="-70" dirty="0">
+                <a:solidFill>
+                  <a:srgbClr val="9BC850"/>
+                </a:solidFill>
+                <a:latin typeface="Arial" panose="020B0604020202020204"/>
+                <a:cs typeface="Arial" panose="020B0604020202020204"/>
+              </a:rPr>
+              <a:t> </a:t>
+            </a:r>
+            <a:r>
+              <a:rPr sz="3600" b="1" spc="335" dirty="0">
+                <a:solidFill>
+                  <a:srgbClr val="9BC850"/>
+                </a:solidFill>
+                <a:latin typeface="Arial" panose="020B0604020202020204"/>
+                <a:cs typeface="Arial" panose="020B0604020202020204"/>
+              </a:rPr>
+              <a:t>-</a:t>
+            </a:r>
+            <a:r>
+              <a:rPr sz="3600" b="1" spc="-70" dirty="0">
+                <a:solidFill>
+                  <a:srgbClr val="9BC850"/>
+                </a:solidFill>
+                <a:latin typeface="Arial" panose="020B0604020202020204"/>
+                <a:cs typeface="Arial" panose="020B0604020202020204"/>
+              </a:rPr>
+              <a:t> </a:t>
+            </a:r>
+            <a:r>
+              <a:rPr sz="3600" b="1" spc="-100" dirty="0">
+                <a:solidFill>
+                  <a:srgbClr val="9BC850"/>
+                </a:solidFill>
+                <a:latin typeface="Arial" panose="020B0604020202020204"/>
+                <a:cs typeface="Arial" panose="020B0604020202020204"/>
+              </a:rPr>
+              <a:t>Displays</a:t>
+            </a:r>
+            <a:r>
+              <a:rPr sz="3600" b="1" spc="-65" dirty="0">
+                <a:solidFill>
+                  <a:srgbClr val="9BC850"/>
+                </a:solidFill>
+                <a:latin typeface="Arial" panose="020B0604020202020204"/>
+                <a:cs typeface="Arial" panose="020B0604020202020204"/>
+              </a:rPr>
+              <a:t> </a:t>
+            </a:r>
+            <a:r>
+              <a:rPr sz="3600" b="1" spc="-30" dirty="0">
+                <a:solidFill>
+                  <a:srgbClr val="9BC850"/>
+                </a:solidFill>
+                <a:latin typeface="Arial" panose="020B0604020202020204"/>
+                <a:cs typeface="Arial" panose="020B0604020202020204"/>
+              </a:rPr>
+              <a:t>available</a:t>
+            </a:r>
+            <a:r>
+              <a:rPr sz="3600" b="1" spc="-65" dirty="0">
+                <a:solidFill>
+                  <a:srgbClr val="9BC850"/>
+                </a:solidFill>
+                <a:latin typeface="Arial" panose="020B0604020202020204"/>
+                <a:cs typeface="Arial" panose="020B0604020202020204"/>
+              </a:rPr>
+              <a:t> </a:t>
+            </a:r>
+            <a:r>
+              <a:rPr sz="3600" b="1" spc="-55" dirty="0">
+                <a:solidFill>
+                  <a:srgbClr val="9BC850"/>
+                </a:solidFill>
+                <a:latin typeface="Arial" panose="020B0604020202020204"/>
+                <a:cs typeface="Arial" panose="020B0604020202020204"/>
+              </a:rPr>
+              <a:t>commands</a:t>
+            </a:r>
+            <a:endParaRPr sz="3600">
+              <a:latin typeface="Arial" panose="020B0604020202020204"/>
+              <a:cs typeface="Arial" panose="020B0604020202020204"/>
+            </a:endParaRPr>
+          </a:p>
+          <a:p>
+            <a:pPr marL="12700">
+              <a:lnSpc>
+                <a:spcPct val="100000"/>
+              </a:lnSpc>
+              <a:spcBef>
+                <a:spcPts val="2685"/>
+              </a:spcBef>
+            </a:pPr>
+            <a:r>
+              <a:rPr sz="3600" b="1" spc="-5" dirty="0">
+                <a:solidFill>
+                  <a:srgbClr val="9BC850"/>
+                </a:solidFill>
+                <a:latin typeface="Arial" panose="020B0604020202020204"/>
+                <a:cs typeface="Arial" panose="020B0604020202020204"/>
+              </a:rPr>
+              <a:t>ng</a:t>
+            </a:r>
+            <a:r>
+              <a:rPr sz="3600" b="1" spc="-75" dirty="0">
+                <a:solidFill>
+                  <a:srgbClr val="9BC850"/>
+                </a:solidFill>
+                <a:latin typeface="Arial" panose="020B0604020202020204"/>
+                <a:cs typeface="Arial" panose="020B0604020202020204"/>
+              </a:rPr>
+              <a:t> </a:t>
+            </a:r>
+            <a:r>
+              <a:rPr sz="3600" b="1" spc="45" dirty="0">
+                <a:solidFill>
+                  <a:srgbClr val="9BC850"/>
+                </a:solidFill>
+                <a:latin typeface="Arial" panose="020B0604020202020204"/>
+                <a:cs typeface="Arial" panose="020B0604020202020204"/>
+              </a:rPr>
+              <a:t>new</a:t>
+            </a:r>
+            <a:r>
+              <a:rPr sz="3600" b="1" spc="-70" dirty="0">
+                <a:solidFill>
+                  <a:srgbClr val="9BC850"/>
+                </a:solidFill>
+                <a:latin typeface="Arial" panose="020B0604020202020204"/>
+                <a:cs typeface="Arial" panose="020B0604020202020204"/>
+              </a:rPr>
+              <a:t> </a:t>
+            </a:r>
+            <a:r>
+              <a:rPr sz="3600" b="1" spc="335" dirty="0">
+                <a:solidFill>
+                  <a:srgbClr val="9BC850"/>
+                </a:solidFill>
+                <a:latin typeface="Arial" panose="020B0604020202020204"/>
+                <a:cs typeface="Arial" panose="020B0604020202020204"/>
+              </a:rPr>
+              <a:t>-</a:t>
+            </a:r>
+            <a:r>
+              <a:rPr sz="3600" b="1" spc="-70" dirty="0">
+                <a:solidFill>
+                  <a:srgbClr val="9BC850"/>
+                </a:solidFill>
+                <a:latin typeface="Arial" panose="020B0604020202020204"/>
+                <a:cs typeface="Arial" panose="020B0604020202020204"/>
+              </a:rPr>
+              <a:t> </a:t>
+            </a:r>
+            <a:r>
+              <a:rPr sz="3600" b="1" spc="20" dirty="0">
+                <a:solidFill>
+                  <a:srgbClr val="9BC850"/>
+                </a:solidFill>
+                <a:latin typeface="Arial" panose="020B0604020202020204"/>
+                <a:cs typeface="Arial" panose="020B0604020202020204"/>
+              </a:rPr>
+              <a:t>Creates</a:t>
+            </a:r>
+            <a:r>
+              <a:rPr sz="3600" b="1" spc="-65" dirty="0">
+                <a:solidFill>
+                  <a:srgbClr val="9BC850"/>
+                </a:solidFill>
+                <a:latin typeface="Arial" panose="020B0604020202020204"/>
+                <a:cs typeface="Arial" panose="020B0604020202020204"/>
+              </a:rPr>
+              <a:t> </a:t>
+            </a:r>
+            <a:r>
+              <a:rPr sz="3600" b="1" spc="-30" dirty="0">
+                <a:solidFill>
+                  <a:srgbClr val="9BC850"/>
+                </a:solidFill>
+                <a:latin typeface="Arial" panose="020B0604020202020204"/>
+                <a:cs typeface="Arial" panose="020B0604020202020204"/>
+              </a:rPr>
+              <a:t>a</a:t>
+            </a:r>
+            <a:r>
+              <a:rPr sz="3600" b="1" spc="-70" dirty="0">
+                <a:solidFill>
+                  <a:srgbClr val="9BC850"/>
+                </a:solidFill>
+                <a:latin typeface="Arial" panose="020B0604020202020204"/>
+                <a:cs typeface="Arial" panose="020B0604020202020204"/>
+              </a:rPr>
+              <a:t> </a:t>
+            </a:r>
+            <a:r>
+              <a:rPr sz="3600" b="1" spc="40" dirty="0">
+                <a:solidFill>
+                  <a:srgbClr val="9BC850"/>
+                </a:solidFill>
+                <a:latin typeface="Arial" panose="020B0604020202020204"/>
+                <a:cs typeface="Arial" panose="020B0604020202020204"/>
+              </a:rPr>
+              <a:t>new</a:t>
+            </a:r>
+            <a:r>
+              <a:rPr sz="3600" b="1" spc="-70" dirty="0">
+                <a:solidFill>
+                  <a:srgbClr val="9BC850"/>
+                </a:solidFill>
+                <a:latin typeface="Arial" panose="020B0604020202020204"/>
+                <a:cs typeface="Arial" panose="020B0604020202020204"/>
+              </a:rPr>
+              <a:t> </a:t>
+            </a:r>
+            <a:r>
+              <a:rPr sz="3600" b="1" spc="-60" dirty="0">
+                <a:solidFill>
+                  <a:srgbClr val="9BC850"/>
+                </a:solidFill>
+                <a:latin typeface="Arial" panose="020B0604020202020204"/>
+                <a:cs typeface="Arial" panose="020B0604020202020204"/>
+              </a:rPr>
+              <a:t>Angular</a:t>
+            </a:r>
+            <a:r>
+              <a:rPr sz="3600" b="1" spc="-70" dirty="0">
+                <a:solidFill>
+                  <a:srgbClr val="9BC850"/>
+                </a:solidFill>
+                <a:latin typeface="Arial" panose="020B0604020202020204"/>
+                <a:cs typeface="Arial" panose="020B0604020202020204"/>
+              </a:rPr>
+              <a:t> </a:t>
+            </a:r>
+            <a:r>
+              <a:rPr sz="3600" b="1" dirty="0">
+                <a:solidFill>
+                  <a:srgbClr val="9BC850"/>
+                </a:solidFill>
+                <a:latin typeface="Arial" panose="020B0604020202020204"/>
+                <a:cs typeface="Arial" panose="020B0604020202020204"/>
+              </a:rPr>
+              <a:t>application</a:t>
+            </a:r>
+            <a:endParaRPr sz="3600">
+              <a:latin typeface="Arial" panose="020B0604020202020204"/>
+              <a:cs typeface="Arial" panose="020B0604020202020204"/>
+            </a:endParaRPr>
+          </a:p>
+          <a:p>
+            <a:pPr marL="12700" marR="1685925">
+              <a:lnSpc>
+                <a:spcPts val="7010"/>
+              </a:lnSpc>
+              <a:spcBef>
+                <a:spcPts val="660"/>
+              </a:spcBef>
+            </a:pPr>
+            <a:r>
+              <a:rPr sz="3600" b="1" spc="-5" dirty="0">
+                <a:solidFill>
+                  <a:srgbClr val="9BC850"/>
+                </a:solidFill>
+                <a:latin typeface="Arial" panose="020B0604020202020204"/>
+                <a:cs typeface="Arial" panose="020B0604020202020204"/>
+              </a:rPr>
+              <a:t>ng</a:t>
+            </a:r>
+            <a:r>
+              <a:rPr sz="3600" b="1" spc="-75" dirty="0">
+                <a:solidFill>
+                  <a:srgbClr val="9BC850"/>
+                </a:solidFill>
+                <a:latin typeface="Arial" panose="020B0604020202020204"/>
+                <a:cs typeface="Arial" panose="020B0604020202020204"/>
+              </a:rPr>
+              <a:t> </a:t>
+            </a:r>
+            <a:r>
+              <a:rPr sz="3600" b="1" spc="-25" dirty="0">
+                <a:solidFill>
+                  <a:srgbClr val="9BC850"/>
+                </a:solidFill>
+                <a:latin typeface="Arial" panose="020B0604020202020204"/>
+                <a:cs typeface="Arial" panose="020B0604020202020204"/>
+              </a:rPr>
+              <a:t>serve</a:t>
+            </a:r>
+            <a:r>
+              <a:rPr sz="3600" b="1" spc="-65" dirty="0">
+                <a:solidFill>
+                  <a:srgbClr val="9BC850"/>
+                </a:solidFill>
+                <a:latin typeface="Arial" panose="020B0604020202020204"/>
+                <a:cs typeface="Arial" panose="020B0604020202020204"/>
+              </a:rPr>
+              <a:t> </a:t>
+            </a:r>
+            <a:r>
+              <a:rPr sz="3600" b="1" spc="335" dirty="0">
+                <a:solidFill>
+                  <a:srgbClr val="9BC850"/>
+                </a:solidFill>
+                <a:latin typeface="Arial" panose="020B0604020202020204"/>
+                <a:cs typeface="Arial" panose="020B0604020202020204"/>
+              </a:rPr>
+              <a:t>-</a:t>
+            </a:r>
+            <a:r>
+              <a:rPr sz="3600" b="1" spc="-65" dirty="0">
+                <a:solidFill>
+                  <a:srgbClr val="9BC850"/>
+                </a:solidFill>
+                <a:latin typeface="Arial" panose="020B0604020202020204"/>
+                <a:cs typeface="Arial" panose="020B0604020202020204"/>
+              </a:rPr>
+              <a:t> </a:t>
+            </a:r>
+            <a:r>
+              <a:rPr sz="3600" b="1" spc="-100" dirty="0">
+                <a:solidFill>
+                  <a:srgbClr val="9BC850"/>
+                </a:solidFill>
+                <a:latin typeface="Arial" panose="020B0604020202020204"/>
+                <a:cs typeface="Arial" panose="020B0604020202020204"/>
+              </a:rPr>
+              <a:t>Builds</a:t>
+            </a:r>
+            <a:r>
+              <a:rPr sz="3600" b="1" spc="-65" dirty="0">
+                <a:solidFill>
+                  <a:srgbClr val="9BC850"/>
+                </a:solidFill>
+                <a:latin typeface="Arial" panose="020B0604020202020204"/>
+                <a:cs typeface="Arial" panose="020B0604020202020204"/>
+              </a:rPr>
+              <a:t> </a:t>
+            </a:r>
+            <a:r>
+              <a:rPr sz="3600" b="1" spc="110" dirty="0">
+                <a:solidFill>
+                  <a:srgbClr val="9BC850"/>
+                </a:solidFill>
+                <a:latin typeface="Arial" panose="020B0604020202020204"/>
+                <a:cs typeface="Arial" panose="020B0604020202020204"/>
+              </a:rPr>
+              <a:t>the</a:t>
+            </a:r>
+            <a:r>
+              <a:rPr sz="3600" b="1" spc="-65" dirty="0">
+                <a:solidFill>
+                  <a:srgbClr val="9BC850"/>
+                </a:solidFill>
+                <a:latin typeface="Arial" panose="020B0604020202020204"/>
+                <a:cs typeface="Arial" panose="020B0604020202020204"/>
+              </a:rPr>
+              <a:t> </a:t>
+            </a:r>
+            <a:r>
+              <a:rPr sz="3600" b="1" spc="5" dirty="0">
+                <a:solidFill>
+                  <a:srgbClr val="9BC850"/>
+                </a:solidFill>
+                <a:latin typeface="Arial" panose="020B0604020202020204"/>
+                <a:cs typeface="Arial" panose="020B0604020202020204"/>
+              </a:rPr>
+              <a:t>app</a:t>
+            </a:r>
+            <a:r>
+              <a:rPr sz="3600" b="1" spc="-65" dirty="0">
+                <a:solidFill>
+                  <a:srgbClr val="9BC850"/>
+                </a:solidFill>
+                <a:latin typeface="Arial" panose="020B0604020202020204"/>
+                <a:cs typeface="Arial" panose="020B0604020202020204"/>
+              </a:rPr>
+              <a:t> </a:t>
+            </a:r>
+            <a:r>
+              <a:rPr sz="3600" b="1" spc="-10" dirty="0">
+                <a:solidFill>
+                  <a:srgbClr val="9BC850"/>
+                </a:solidFill>
+                <a:latin typeface="Arial" panose="020B0604020202020204"/>
+                <a:cs typeface="Arial" panose="020B0604020202020204"/>
+              </a:rPr>
+              <a:t>and</a:t>
+            </a:r>
+            <a:r>
+              <a:rPr sz="3600" b="1" spc="-70" dirty="0">
+                <a:solidFill>
+                  <a:srgbClr val="9BC850"/>
+                </a:solidFill>
+                <a:latin typeface="Arial" panose="020B0604020202020204"/>
+                <a:cs typeface="Arial" panose="020B0604020202020204"/>
+              </a:rPr>
+              <a:t> </a:t>
+            </a:r>
+            <a:r>
+              <a:rPr sz="3600" b="1" spc="-25" dirty="0">
+                <a:solidFill>
+                  <a:srgbClr val="9BC850"/>
+                </a:solidFill>
+                <a:latin typeface="Arial" panose="020B0604020202020204"/>
+                <a:cs typeface="Arial" panose="020B0604020202020204"/>
+              </a:rPr>
+              <a:t>launches</a:t>
+            </a:r>
+            <a:r>
+              <a:rPr sz="3600" b="1" spc="-60" dirty="0">
+                <a:solidFill>
+                  <a:srgbClr val="9BC850"/>
+                </a:solidFill>
+                <a:latin typeface="Arial" panose="020B0604020202020204"/>
+                <a:cs typeface="Arial" panose="020B0604020202020204"/>
+              </a:rPr>
+              <a:t> </a:t>
+            </a:r>
+            <a:r>
+              <a:rPr sz="3600" b="1" spc="-30" dirty="0">
+                <a:solidFill>
+                  <a:srgbClr val="9BC850"/>
+                </a:solidFill>
+                <a:latin typeface="Arial" panose="020B0604020202020204"/>
+                <a:cs typeface="Arial" panose="020B0604020202020204"/>
+              </a:rPr>
+              <a:t>a</a:t>
+            </a:r>
+            <a:r>
+              <a:rPr sz="3600" b="1" spc="-70" dirty="0">
+                <a:solidFill>
+                  <a:srgbClr val="9BC850"/>
+                </a:solidFill>
+                <a:latin typeface="Arial" panose="020B0604020202020204"/>
+                <a:cs typeface="Arial" panose="020B0604020202020204"/>
+              </a:rPr>
+              <a:t> </a:t>
+            </a:r>
+            <a:r>
+              <a:rPr sz="3600" b="1" spc="-30" dirty="0">
+                <a:solidFill>
+                  <a:srgbClr val="9BC850"/>
+                </a:solidFill>
+                <a:latin typeface="Arial" panose="020B0604020202020204"/>
+                <a:cs typeface="Arial" panose="020B0604020202020204"/>
+              </a:rPr>
+              <a:t>server </a:t>
+            </a:r>
+            <a:r>
+              <a:rPr sz="3600" b="1" spc="-985" dirty="0">
+                <a:solidFill>
+                  <a:srgbClr val="9BC850"/>
+                </a:solidFill>
+                <a:latin typeface="Arial" panose="020B0604020202020204"/>
+                <a:cs typeface="Arial" panose="020B0604020202020204"/>
+              </a:rPr>
+              <a:t> </a:t>
+            </a:r>
+            <a:r>
+              <a:rPr sz="3600" b="1" spc="-5" dirty="0">
+                <a:solidFill>
+                  <a:srgbClr val="9BC850"/>
+                </a:solidFill>
+                <a:latin typeface="Arial" panose="020B0604020202020204"/>
+                <a:cs typeface="Arial" panose="020B0604020202020204"/>
+              </a:rPr>
+              <a:t>ng</a:t>
+            </a:r>
+            <a:r>
+              <a:rPr sz="3600" b="1" spc="-75" dirty="0">
+                <a:solidFill>
+                  <a:srgbClr val="9BC850"/>
+                </a:solidFill>
+                <a:latin typeface="Arial" panose="020B0604020202020204"/>
+                <a:cs typeface="Arial" panose="020B0604020202020204"/>
+              </a:rPr>
+              <a:t> </a:t>
+            </a:r>
+            <a:r>
+              <a:rPr sz="3600" b="1" spc="50" dirty="0">
+                <a:solidFill>
+                  <a:srgbClr val="9BC850"/>
+                </a:solidFill>
+                <a:latin typeface="Arial" panose="020B0604020202020204"/>
+                <a:cs typeface="Arial" panose="020B0604020202020204"/>
+              </a:rPr>
+              <a:t>generate</a:t>
+            </a:r>
+            <a:r>
+              <a:rPr sz="3600" b="1" spc="-60" dirty="0">
+                <a:solidFill>
+                  <a:srgbClr val="9BC850"/>
+                </a:solidFill>
+                <a:latin typeface="Arial" panose="020B0604020202020204"/>
+                <a:cs typeface="Arial" panose="020B0604020202020204"/>
+              </a:rPr>
+              <a:t> </a:t>
+            </a:r>
+            <a:r>
+              <a:rPr sz="3600" b="1" spc="335" dirty="0">
+                <a:solidFill>
+                  <a:srgbClr val="9BC850"/>
+                </a:solidFill>
+                <a:latin typeface="Arial" panose="020B0604020202020204"/>
+                <a:cs typeface="Arial" panose="020B0604020202020204"/>
+              </a:rPr>
+              <a:t>-</a:t>
+            </a:r>
+            <a:r>
+              <a:rPr sz="3600" b="1" spc="-65" dirty="0">
+                <a:solidFill>
+                  <a:srgbClr val="9BC850"/>
+                </a:solidFill>
+                <a:latin typeface="Arial" panose="020B0604020202020204"/>
+                <a:cs typeface="Arial" panose="020B0604020202020204"/>
+              </a:rPr>
+              <a:t> </a:t>
+            </a:r>
+            <a:r>
+              <a:rPr sz="3600" b="1" spc="15" dirty="0">
+                <a:solidFill>
+                  <a:srgbClr val="9BC850"/>
+                </a:solidFill>
+                <a:latin typeface="Arial" panose="020B0604020202020204"/>
+                <a:cs typeface="Arial" panose="020B0604020202020204"/>
+              </a:rPr>
+              <a:t>Generates</a:t>
+            </a:r>
+            <a:r>
+              <a:rPr sz="3600" b="1" spc="-60" dirty="0">
+                <a:solidFill>
+                  <a:srgbClr val="9BC850"/>
+                </a:solidFill>
+                <a:latin typeface="Arial" panose="020B0604020202020204"/>
+                <a:cs typeface="Arial" panose="020B0604020202020204"/>
+              </a:rPr>
+              <a:t> </a:t>
+            </a:r>
+            <a:r>
+              <a:rPr sz="3600" b="1" spc="40" dirty="0">
+                <a:solidFill>
+                  <a:srgbClr val="9BC850"/>
+                </a:solidFill>
+                <a:latin typeface="Arial" panose="020B0604020202020204"/>
+                <a:cs typeface="Arial" panose="020B0604020202020204"/>
+              </a:rPr>
+              <a:t>code</a:t>
+            </a:r>
+            <a:endParaRPr sz="3600">
+              <a:latin typeface="Arial" panose="020B0604020202020204"/>
+              <a:cs typeface="Arial" panose="020B0604020202020204"/>
+            </a:endParaRPr>
+          </a:p>
+          <a:p>
+            <a:pPr marL="12700">
+              <a:lnSpc>
+                <a:spcPct val="100000"/>
+              </a:lnSpc>
+              <a:spcBef>
+                <a:spcPts val="2000"/>
+              </a:spcBef>
+            </a:pPr>
+            <a:r>
+              <a:rPr sz="3600" b="1" spc="-5" dirty="0">
+                <a:solidFill>
+                  <a:srgbClr val="9BC850"/>
+                </a:solidFill>
+                <a:latin typeface="Arial" panose="020B0604020202020204"/>
+                <a:cs typeface="Arial" panose="020B0604020202020204"/>
+              </a:rPr>
+              <a:t>ng</a:t>
+            </a:r>
+            <a:r>
+              <a:rPr sz="3600" b="1" spc="-70" dirty="0">
+                <a:solidFill>
+                  <a:srgbClr val="9BC850"/>
+                </a:solidFill>
+                <a:latin typeface="Arial" panose="020B0604020202020204"/>
+                <a:cs typeface="Arial" panose="020B0604020202020204"/>
+              </a:rPr>
+              <a:t> </a:t>
+            </a:r>
+            <a:r>
+              <a:rPr sz="3600" b="1" spc="5" dirty="0">
+                <a:solidFill>
+                  <a:srgbClr val="9BC850"/>
+                </a:solidFill>
+                <a:latin typeface="Arial" panose="020B0604020202020204"/>
+                <a:cs typeface="Arial" panose="020B0604020202020204"/>
+              </a:rPr>
+              <a:t>add</a:t>
+            </a:r>
+            <a:r>
+              <a:rPr sz="3600" b="1" spc="-60" dirty="0">
+                <a:solidFill>
+                  <a:srgbClr val="9BC850"/>
+                </a:solidFill>
+                <a:latin typeface="Arial" panose="020B0604020202020204"/>
+                <a:cs typeface="Arial" panose="020B0604020202020204"/>
+              </a:rPr>
+              <a:t> </a:t>
+            </a:r>
+            <a:r>
+              <a:rPr sz="3600" b="1" spc="335" dirty="0">
+                <a:solidFill>
+                  <a:srgbClr val="9BC850"/>
+                </a:solidFill>
+                <a:latin typeface="Arial" panose="020B0604020202020204"/>
+                <a:cs typeface="Arial" panose="020B0604020202020204"/>
+              </a:rPr>
+              <a:t>-</a:t>
+            </a:r>
+            <a:r>
+              <a:rPr sz="3600" b="1" spc="-65" dirty="0">
+                <a:solidFill>
+                  <a:srgbClr val="9BC850"/>
+                </a:solidFill>
+                <a:latin typeface="Arial" panose="020B0604020202020204"/>
+                <a:cs typeface="Arial" panose="020B0604020202020204"/>
+              </a:rPr>
+              <a:t> </a:t>
+            </a:r>
+            <a:r>
+              <a:rPr sz="3600" b="1" spc="-110" dirty="0">
+                <a:solidFill>
+                  <a:srgbClr val="9BC850"/>
+                </a:solidFill>
+                <a:latin typeface="Arial" panose="020B0604020202020204"/>
+                <a:cs typeface="Arial" panose="020B0604020202020204"/>
+              </a:rPr>
+              <a:t>Adds</a:t>
+            </a:r>
+            <a:r>
+              <a:rPr sz="3600" b="1" spc="-60" dirty="0">
+                <a:solidFill>
+                  <a:srgbClr val="9BC850"/>
+                </a:solidFill>
+                <a:latin typeface="Arial" panose="020B0604020202020204"/>
+                <a:cs typeface="Arial" panose="020B0604020202020204"/>
+              </a:rPr>
+              <a:t> </a:t>
+            </a:r>
+            <a:r>
+              <a:rPr sz="3600" b="1" spc="-10" dirty="0">
+                <a:solidFill>
+                  <a:srgbClr val="9BC850"/>
+                </a:solidFill>
+                <a:latin typeface="Arial" panose="020B0604020202020204"/>
+                <a:cs typeface="Arial" panose="020B0604020202020204"/>
+              </a:rPr>
+              <a:t>support</a:t>
+            </a:r>
+            <a:r>
+              <a:rPr sz="3600" b="1" spc="-60" dirty="0">
+                <a:solidFill>
+                  <a:srgbClr val="9BC850"/>
+                </a:solidFill>
+                <a:latin typeface="Arial" panose="020B0604020202020204"/>
+                <a:cs typeface="Arial" panose="020B0604020202020204"/>
+              </a:rPr>
+              <a:t> </a:t>
+            </a:r>
+            <a:r>
+              <a:rPr sz="3600" b="1" spc="-10" dirty="0">
+                <a:solidFill>
+                  <a:srgbClr val="9BC850"/>
+                </a:solidFill>
+                <a:latin typeface="Arial" panose="020B0604020202020204"/>
+                <a:cs typeface="Arial" panose="020B0604020202020204"/>
+              </a:rPr>
+              <a:t>for</a:t>
+            </a:r>
+            <a:r>
+              <a:rPr sz="3600" b="1" spc="-65" dirty="0">
+                <a:solidFill>
+                  <a:srgbClr val="9BC850"/>
+                </a:solidFill>
+                <a:latin typeface="Arial" panose="020B0604020202020204"/>
+                <a:cs typeface="Arial" panose="020B0604020202020204"/>
+              </a:rPr>
+              <a:t> </a:t>
+            </a:r>
+            <a:r>
+              <a:rPr sz="3600" b="1" spc="-25" dirty="0">
+                <a:solidFill>
+                  <a:srgbClr val="9BC850"/>
+                </a:solidFill>
+                <a:latin typeface="Arial" panose="020B0604020202020204"/>
+                <a:cs typeface="Arial" panose="020B0604020202020204"/>
+              </a:rPr>
+              <a:t>an</a:t>
+            </a:r>
+            <a:r>
+              <a:rPr sz="3600" b="1" spc="-60" dirty="0">
+                <a:solidFill>
+                  <a:srgbClr val="9BC850"/>
+                </a:solidFill>
+                <a:latin typeface="Arial" panose="020B0604020202020204"/>
+                <a:cs typeface="Arial" panose="020B0604020202020204"/>
+              </a:rPr>
+              <a:t> </a:t>
+            </a:r>
+            <a:r>
+              <a:rPr sz="3600" b="1" spc="15" dirty="0">
+                <a:solidFill>
+                  <a:srgbClr val="9BC850"/>
+                </a:solidFill>
+                <a:latin typeface="Arial" panose="020B0604020202020204"/>
+                <a:cs typeface="Arial" panose="020B0604020202020204"/>
+              </a:rPr>
+              <a:t>external</a:t>
+            </a:r>
+            <a:r>
+              <a:rPr sz="3600" b="1" spc="-65" dirty="0">
+                <a:solidFill>
+                  <a:srgbClr val="9BC850"/>
+                </a:solidFill>
+                <a:latin typeface="Arial" panose="020B0604020202020204"/>
+                <a:cs typeface="Arial" panose="020B0604020202020204"/>
+              </a:rPr>
+              <a:t> </a:t>
+            </a:r>
+            <a:r>
+              <a:rPr sz="3600" b="1" spc="-45" dirty="0">
+                <a:solidFill>
+                  <a:srgbClr val="9BC850"/>
+                </a:solidFill>
+                <a:latin typeface="Arial" panose="020B0604020202020204"/>
+                <a:cs typeface="Arial" panose="020B0604020202020204"/>
+              </a:rPr>
+              <a:t>library</a:t>
+            </a:r>
+            <a:r>
+              <a:rPr sz="3600" b="1" spc="-70" dirty="0">
+                <a:solidFill>
+                  <a:srgbClr val="9BC850"/>
+                </a:solidFill>
+                <a:latin typeface="Arial" panose="020B0604020202020204"/>
+                <a:cs typeface="Arial" panose="020B0604020202020204"/>
+              </a:rPr>
+              <a:t> </a:t>
+            </a:r>
+            <a:r>
+              <a:rPr sz="3600" b="1" spc="75" dirty="0">
+                <a:solidFill>
+                  <a:srgbClr val="9BC850"/>
+                </a:solidFill>
+                <a:latin typeface="Arial" panose="020B0604020202020204"/>
+                <a:cs typeface="Arial" panose="020B0604020202020204"/>
+              </a:rPr>
+              <a:t>to</a:t>
+            </a:r>
+            <a:r>
+              <a:rPr sz="3600" b="1" spc="-65" dirty="0">
+                <a:solidFill>
+                  <a:srgbClr val="9BC850"/>
+                </a:solidFill>
+                <a:latin typeface="Arial" panose="020B0604020202020204"/>
+                <a:cs typeface="Arial" panose="020B0604020202020204"/>
+              </a:rPr>
+              <a:t> </a:t>
+            </a:r>
+            <a:r>
+              <a:rPr sz="3600" b="1" spc="110" dirty="0">
+                <a:solidFill>
+                  <a:srgbClr val="9BC850"/>
+                </a:solidFill>
+                <a:latin typeface="Arial" panose="020B0604020202020204"/>
+                <a:cs typeface="Arial" panose="020B0604020202020204"/>
+              </a:rPr>
+              <a:t>the</a:t>
+            </a:r>
+            <a:r>
+              <a:rPr sz="3600" b="1" spc="-60" dirty="0">
+                <a:solidFill>
+                  <a:srgbClr val="9BC850"/>
+                </a:solidFill>
+                <a:latin typeface="Arial" panose="020B0604020202020204"/>
+                <a:cs typeface="Arial" panose="020B0604020202020204"/>
+              </a:rPr>
+              <a:t> </a:t>
+            </a:r>
+            <a:r>
+              <a:rPr sz="3600" b="1" spc="5" dirty="0">
+                <a:solidFill>
+                  <a:srgbClr val="9BC850"/>
+                </a:solidFill>
+                <a:latin typeface="Arial" panose="020B0604020202020204"/>
+                <a:cs typeface="Arial" panose="020B0604020202020204"/>
+              </a:rPr>
+              <a:t>app</a:t>
+            </a:r>
+            <a:endParaRPr sz="3600">
+              <a:latin typeface="Arial" panose="020B0604020202020204"/>
+              <a:cs typeface="Arial" panose="020B0604020202020204"/>
+            </a:endParaRPr>
+          </a:p>
+          <a:p>
+            <a:pPr marL="12700">
+              <a:lnSpc>
+                <a:spcPct val="100000"/>
+              </a:lnSpc>
+              <a:spcBef>
+                <a:spcPts val="2785"/>
+              </a:spcBef>
+            </a:pPr>
+            <a:r>
+              <a:rPr sz="3600" b="1" spc="-5" dirty="0">
+                <a:solidFill>
+                  <a:srgbClr val="9BC850"/>
+                </a:solidFill>
+                <a:latin typeface="Arial" panose="020B0604020202020204"/>
+                <a:cs typeface="Arial" panose="020B0604020202020204"/>
+              </a:rPr>
+              <a:t>ng</a:t>
+            </a:r>
+            <a:r>
+              <a:rPr sz="3600" b="1" spc="-75" dirty="0">
+                <a:solidFill>
+                  <a:srgbClr val="9BC850"/>
+                </a:solidFill>
+                <a:latin typeface="Arial" panose="020B0604020202020204"/>
+                <a:cs typeface="Arial" panose="020B0604020202020204"/>
+              </a:rPr>
+              <a:t> </a:t>
+            </a:r>
+            <a:r>
+              <a:rPr sz="3600" b="1" spc="70" dirty="0">
+                <a:solidFill>
+                  <a:srgbClr val="9BC850"/>
+                </a:solidFill>
+                <a:latin typeface="Arial" panose="020B0604020202020204"/>
+                <a:cs typeface="Arial" panose="020B0604020202020204"/>
+              </a:rPr>
+              <a:t>test</a:t>
+            </a:r>
+            <a:r>
+              <a:rPr sz="3600" b="1" spc="-65" dirty="0">
+                <a:solidFill>
+                  <a:srgbClr val="9BC850"/>
+                </a:solidFill>
+                <a:latin typeface="Arial" panose="020B0604020202020204"/>
+                <a:cs typeface="Arial" panose="020B0604020202020204"/>
+              </a:rPr>
+              <a:t> </a:t>
+            </a:r>
+            <a:r>
+              <a:rPr sz="3600" b="1" spc="335" dirty="0">
+                <a:solidFill>
+                  <a:srgbClr val="9BC850"/>
+                </a:solidFill>
+                <a:latin typeface="Arial" panose="020B0604020202020204"/>
+                <a:cs typeface="Arial" panose="020B0604020202020204"/>
+              </a:rPr>
+              <a:t>-</a:t>
+            </a:r>
+            <a:r>
+              <a:rPr sz="3600" b="1" spc="-70" dirty="0">
+                <a:solidFill>
+                  <a:srgbClr val="9BC850"/>
+                </a:solidFill>
+                <a:latin typeface="Arial" panose="020B0604020202020204"/>
+                <a:cs typeface="Arial" panose="020B0604020202020204"/>
+              </a:rPr>
+              <a:t> </a:t>
+            </a:r>
+            <a:r>
+              <a:rPr sz="3600" b="1" spc="-140" dirty="0">
+                <a:solidFill>
+                  <a:srgbClr val="9BC850"/>
+                </a:solidFill>
+                <a:latin typeface="Arial" panose="020B0604020202020204"/>
+                <a:cs typeface="Arial" panose="020B0604020202020204"/>
+              </a:rPr>
+              <a:t>Runs</a:t>
+            </a:r>
+            <a:r>
+              <a:rPr sz="3600" b="1" spc="-65" dirty="0">
+                <a:solidFill>
+                  <a:srgbClr val="9BC850"/>
+                </a:solidFill>
+                <a:latin typeface="Arial" panose="020B0604020202020204"/>
+                <a:cs typeface="Arial" panose="020B0604020202020204"/>
+              </a:rPr>
+              <a:t> </a:t>
+            </a:r>
+            <a:r>
+              <a:rPr sz="3600" b="1" spc="35" dirty="0">
+                <a:solidFill>
+                  <a:srgbClr val="9BC850"/>
+                </a:solidFill>
+                <a:latin typeface="Arial" panose="020B0604020202020204"/>
+                <a:cs typeface="Arial" panose="020B0604020202020204"/>
+              </a:rPr>
+              <a:t>unit</a:t>
+            </a:r>
+            <a:r>
+              <a:rPr sz="3600" b="1" spc="-55" dirty="0">
+                <a:solidFill>
+                  <a:srgbClr val="9BC850"/>
+                </a:solidFill>
+                <a:latin typeface="Arial" panose="020B0604020202020204"/>
+                <a:cs typeface="Arial" panose="020B0604020202020204"/>
+              </a:rPr>
+              <a:t> </a:t>
+            </a:r>
+            <a:r>
+              <a:rPr sz="3600" b="1" spc="-5" dirty="0">
+                <a:solidFill>
+                  <a:srgbClr val="9BC850"/>
+                </a:solidFill>
+                <a:latin typeface="Arial" panose="020B0604020202020204"/>
+                <a:cs typeface="Arial" panose="020B0604020202020204"/>
+              </a:rPr>
+              <a:t>tests</a:t>
+            </a:r>
+            <a:endParaRPr sz="3600">
+              <a:latin typeface="Arial" panose="020B0604020202020204"/>
+              <a:cs typeface="Arial" panose="020B0604020202020204"/>
+            </a:endParaRPr>
+          </a:p>
+          <a:p>
+            <a:pPr marL="12700">
+              <a:lnSpc>
+                <a:spcPct val="100000"/>
+              </a:lnSpc>
+              <a:spcBef>
+                <a:spcPts val="2665"/>
+              </a:spcBef>
+            </a:pPr>
+            <a:r>
+              <a:rPr sz="3600" b="1" spc="-5" dirty="0">
+                <a:solidFill>
+                  <a:srgbClr val="9BC850"/>
+                </a:solidFill>
+                <a:latin typeface="Arial" panose="020B0604020202020204"/>
+                <a:cs typeface="Arial" panose="020B0604020202020204"/>
+              </a:rPr>
+              <a:t>ng</a:t>
+            </a:r>
+            <a:r>
+              <a:rPr sz="3600" b="1" spc="-75" dirty="0">
+                <a:solidFill>
+                  <a:srgbClr val="9BC850"/>
+                </a:solidFill>
+                <a:latin typeface="Arial" panose="020B0604020202020204"/>
+                <a:cs typeface="Arial" panose="020B0604020202020204"/>
+              </a:rPr>
+              <a:t> </a:t>
+            </a:r>
+            <a:r>
+              <a:rPr sz="3600" b="1" spc="110" dirty="0">
+                <a:solidFill>
+                  <a:srgbClr val="9BC850"/>
+                </a:solidFill>
+                <a:latin typeface="Arial" panose="020B0604020202020204"/>
+                <a:cs typeface="Arial" panose="020B0604020202020204"/>
+              </a:rPr>
+              <a:t>e2e</a:t>
+            </a:r>
+            <a:r>
+              <a:rPr sz="3600" b="1" spc="-60" dirty="0">
+                <a:solidFill>
+                  <a:srgbClr val="9BC850"/>
+                </a:solidFill>
+                <a:latin typeface="Arial" panose="020B0604020202020204"/>
+                <a:cs typeface="Arial" panose="020B0604020202020204"/>
+              </a:rPr>
+              <a:t> </a:t>
+            </a:r>
+            <a:r>
+              <a:rPr sz="3600" b="1" spc="335" dirty="0">
+                <a:solidFill>
+                  <a:srgbClr val="9BC850"/>
+                </a:solidFill>
+                <a:latin typeface="Arial" panose="020B0604020202020204"/>
+                <a:cs typeface="Arial" panose="020B0604020202020204"/>
+              </a:rPr>
+              <a:t>-</a:t>
+            </a:r>
+            <a:r>
+              <a:rPr sz="3600" b="1" spc="-70" dirty="0">
+                <a:solidFill>
+                  <a:srgbClr val="9BC850"/>
+                </a:solidFill>
+                <a:latin typeface="Arial" panose="020B0604020202020204"/>
+                <a:cs typeface="Arial" panose="020B0604020202020204"/>
+              </a:rPr>
+              <a:t> </a:t>
+            </a:r>
+            <a:r>
+              <a:rPr sz="3600" b="1" spc="-140" dirty="0">
+                <a:solidFill>
+                  <a:srgbClr val="9BC850"/>
+                </a:solidFill>
+                <a:latin typeface="Arial" panose="020B0604020202020204"/>
+                <a:cs typeface="Arial" panose="020B0604020202020204"/>
+              </a:rPr>
+              <a:t>Runs</a:t>
+            </a:r>
+            <a:r>
+              <a:rPr sz="3600" b="1" spc="-60" dirty="0">
+                <a:solidFill>
+                  <a:srgbClr val="9BC850"/>
+                </a:solidFill>
+                <a:latin typeface="Arial" panose="020B0604020202020204"/>
+                <a:cs typeface="Arial" panose="020B0604020202020204"/>
+              </a:rPr>
+              <a:t> </a:t>
+            </a:r>
+            <a:r>
+              <a:rPr sz="3600" b="1" spc="105" dirty="0">
+                <a:solidFill>
+                  <a:srgbClr val="9BC850"/>
+                </a:solidFill>
+                <a:latin typeface="Arial" panose="020B0604020202020204"/>
+                <a:cs typeface="Arial" panose="020B0604020202020204"/>
+              </a:rPr>
+              <a:t>end-to-end</a:t>
+            </a:r>
+            <a:r>
+              <a:rPr sz="3600" b="1" spc="-70" dirty="0">
+                <a:solidFill>
+                  <a:srgbClr val="9BC850"/>
+                </a:solidFill>
+                <a:latin typeface="Arial" panose="020B0604020202020204"/>
+                <a:cs typeface="Arial" panose="020B0604020202020204"/>
+              </a:rPr>
+              <a:t> </a:t>
+            </a:r>
+            <a:r>
+              <a:rPr sz="3600" b="1" spc="-5" dirty="0">
+                <a:solidFill>
+                  <a:srgbClr val="9BC850"/>
+                </a:solidFill>
+                <a:latin typeface="Arial" panose="020B0604020202020204"/>
+                <a:cs typeface="Arial" panose="020B0604020202020204"/>
+              </a:rPr>
+              <a:t>tests</a:t>
+            </a:r>
+            <a:endParaRPr sz="3600">
+              <a:latin typeface="Arial" panose="020B0604020202020204"/>
+              <a:cs typeface="Arial" panose="020B0604020202020204"/>
+            </a:endParaRPr>
+          </a:p>
+          <a:p>
+            <a:pPr marL="12700" marR="2407920">
+              <a:lnSpc>
+                <a:spcPct val="162000"/>
+              </a:lnSpc>
+            </a:pPr>
+            <a:r>
+              <a:rPr sz="3600" b="1" spc="-5" dirty="0">
+                <a:solidFill>
+                  <a:srgbClr val="9BC850"/>
+                </a:solidFill>
+                <a:latin typeface="Arial" panose="020B0604020202020204"/>
+                <a:cs typeface="Arial" panose="020B0604020202020204"/>
+              </a:rPr>
+              <a:t>ng</a:t>
+            </a:r>
+            <a:r>
+              <a:rPr sz="3600" b="1" spc="-75" dirty="0">
+                <a:solidFill>
+                  <a:srgbClr val="9BC850"/>
+                </a:solidFill>
+                <a:latin typeface="Arial" panose="020B0604020202020204"/>
+                <a:cs typeface="Arial" panose="020B0604020202020204"/>
+              </a:rPr>
+              <a:t> </a:t>
+            </a:r>
+            <a:r>
+              <a:rPr sz="3600" b="1" spc="-20" dirty="0">
+                <a:solidFill>
+                  <a:srgbClr val="9BC850"/>
+                </a:solidFill>
+                <a:latin typeface="Arial" panose="020B0604020202020204"/>
+                <a:cs typeface="Arial" panose="020B0604020202020204"/>
+              </a:rPr>
+              <a:t>build</a:t>
+            </a:r>
+            <a:r>
+              <a:rPr sz="3600" b="1" spc="-60" dirty="0">
+                <a:solidFill>
+                  <a:srgbClr val="9BC850"/>
+                </a:solidFill>
+                <a:latin typeface="Arial" panose="020B0604020202020204"/>
+                <a:cs typeface="Arial" panose="020B0604020202020204"/>
+              </a:rPr>
+              <a:t> </a:t>
+            </a:r>
+            <a:r>
+              <a:rPr sz="3600" b="1" spc="335" dirty="0">
+                <a:solidFill>
+                  <a:srgbClr val="9BC850"/>
+                </a:solidFill>
+                <a:latin typeface="Arial" panose="020B0604020202020204"/>
+                <a:cs typeface="Arial" panose="020B0604020202020204"/>
+              </a:rPr>
+              <a:t>-</a:t>
+            </a:r>
+            <a:r>
+              <a:rPr sz="3600" b="1" spc="-70" dirty="0">
+                <a:solidFill>
+                  <a:srgbClr val="9BC850"/>
+                </a:solidFill>
+                <a:latin typeface="Arial" panose="020B0604020202020204"/>
+                <a:cs typeface="Arial" panose="020B0604020202020204"/>
+              </a:rPr>
+              <a:t> </a:t>
+            </a:r>
+            <a:r>
+              <a:rPr sz="3600" b="1" spc="-40" dirty="0">
+                <a:solidFill>
+                  <a:srgbClr val="9BC850"/>
+                </a:solidFill>
+                <a:latin typeface="Arial" panose="020B0604020202020204"/>
+                <a:cs typeface="Arial" panose="020B0604020202020204"/>
+              </a:rPr>
+              <a:t>Compiles</a:t>
+            </a:r>
+            <a:r>
+              <a:rPr sz="3600" b="1" spc="-60" dirty="0">
+                <a:solidFill>
+                  <a:srgbClr val="9BC850"/>
+                </a:solidFill>
+                <a:latin typeface="Arial" panose="020B0604020202020204"/>
+                <a:cs typeface="Arial" panose="020B0604020202020204"/>
+              </a:rPr>
+              <a:t> </a:t>
+            </a:r>
+            <a:r>
+              <a:rPr sz="3600" b="1" spc="20" dirty="0">
+                <a:solidFill>
+                  <a:srgbClr val="9BC850"/>
+                </a:solidFill>
+                <a:latin typeface="Arial" panose="020B0604020202020204"/>
+                <a:cs typeface="Arial" panose="020B0604020202020204"/>
+              </a:rPr>
+              <a:t>into</a:t>
+            </a:r>
+            <a:r>
+              <a:rPr sz="3600" b="1" spc="-70" dirty="0">
+                <a:solidFill>
+                  <a:srgbClr val="9BC850"/>
+                </a:solidFill>
+                <a:latin typeface="Arial" panose="020B0604020202020204"/>
+                <a:cs typeface="Arial" panose="020B0604020202020204"/>
+              </a:rPr>
+              <a:t> </a:t>
+            </a:r>
+            <a:r>
+              <a:rPr sz="3600" b="1" spc="-25" dirty="0">
+                <a:solidFill>
+                  <a:srgbClr val="9BC850"/>
+                </a:solidFill>
+                <a:latin typeface="Arial" panose="020B0604020202020204"/>
+                <a:cs typeface="Arial" panose="020B0604020202020204"/>
+              </a:rPr>
+              <a:t>an</a:t>
+            </a:r>
+            <a:r>
+              <a:rPr sz="3600" b="1" spc="-60" dirty="0">
+                <a:solidFill>
+                  <a:srgbClr val="9BC850"/>
+                </a:solidFill>
+                <a:latin typeface="Arial" panose="020B0604020202020204"/>
+                <a:cs typeface="Arial" panose="020B0604020202020204"/>
+              </a:rPr>
+              <a:t> </a:t>
+            </a:r>
+            <a:r>
+              <a:rPr sz="3600" b="1" spc="75" dirty="0">
+                <a:solidFill>
+                  <a:srgbClr val="9BC850"/>
+                </a:solidFill>
+                <a:latin typeface="Arial" panose="020B0604020202020204"/>
+                <a:cs typeface="Arial" panose="020B0604020202020204"/>
+              </a:rPr>
+              <a:t>output</a:t>
+            </a:r>
+            <a:r>
+              <a:rPr sz="3600" b="1" spc="-60" dirty="0">
+                <a:solidFill>
+                  <a:srgbClr val="9BC850"/>
+                </a:solidFill>
+                <a:latin typeface="Arial" panose="020B0604020202020204"/>
+                <a:cs typeface="Arial" panose="020B0604020202020204"/>
+              </a:rPr>
+              <a:t> </a:t>
+            </a:r>
+            <a:r>
+              <a:rPr sz="3600" b="1" spc="15" dirty="0">
+                <a:solidFill>
+                  <a:srgbClr val="9BC850"/>
+                </a:solidFill>
+                <a:latin typeface="Arial" panose="020B0604020202020204"/>
+                <a:cs typeface="Arial" panose="020B0604020202020204"/>
+              </a:rPr>
+              <a:t>directory </a:t>
+            </a:r>
+            <a:r>
+              <a:rPr sz="3600" b="1" spc="-990" dirty="0">
+                <a:solidFill>
+                  <a:srgbClr val="9BC850"/>
+                </a:solidFill>
+                <a:latin typeface="Arial" panose="020B0604020202020204"/>
+                <a:cs typeface="Arial" panose="020B0604020202020204"/>
+              </a:rPr>
+              <a:t> </a:t>
+            </a:r>
+            <a:r>
+              <a:rPr sz="3600" b="1" spc="-5" dirty="0">
+                <a:solidFill>
+                  <a:srgbClr val="9BC850"/>
+                </a:solidFill>
+                <a:latin typeface="Arial" panose="020B0604020202020204"/>
+                <a:cs typeface="Arial" panose="020B0604020202020204"/>
+              </a:rPr>
+              <a:t>ng</a:t>
+            </a:r>
+            <a:r>
+              <a:rPr sz="3600" b="1" spc="-75" dirty="0">
+                <a:solidFill>
+                  <a:srgbClr val="9BC850"/>
+                </a:solidFill>
+                <a:latin typeface="Arial" panose="020B0604020202020204"/>
+                <a:cs typeface="Arial" panose="020B0604020202020204"/>
+              </a:rPr>
+              <a:t> </a:t>
+            </a:r>
+            <a:r>
+              <a:rPr sz="3600" b="1" dirty="0">
+                <a:solidFill>
+                  <a:srgbClr val="9BC850"/>
+                </a:solidFill>
+                <a:latin typeface="Arial" panose="020B0604020202020204"/>
+                <a:cs typeface="Arial" panose="020B0604020202020204"/>
+              </a:rPr>
+              <a:t>deploy</a:t>
+            </a:r>
+            <a:r>
+              <a:rPr sz="3600" b="1" spc="-65" dirty="0">
+                <a:solidFill>
+                  <a:srgbClr val="9BC850"/>
+                </a:solidFill>
+                <a:latin typeface="Arial" panose="020B0604020202020204"/>
+                <a:cs typeface="Arial" panose="020B0604020202020204"/>
+              </a:rPr>
+              <a:t> </a:t>
+            </a:r>
+            <a:r>
+              <a:rPr sz="3600" b="1" spc="335" dirty="0">
+                <a:solidFill>
+                  <a:srgbClr val="9BC850"/>
+                </a:solidFill>
+                <a:latin typeface="Arial" panose="020B0604020202020204"/>
+                <a:cs typeface="Arial" panose="020B0604020202020204"/>
+              </a:rPr>
+              <a:t>-</a:t>
+            </a:r>
+            <a:r>
+              <a:rPr sz="3600" b="1" spc="-65" dirty="0">
+                <a:solidFill>
+                  <a:srgbClr val="9BC850"/>
+                </a:solidFill>
+                <a:latin typeface="Arial" panose="020B0604020202020204"/>
+                <a:cs typeface="Arial" panose="020B0604020202020204"/>
+              </a:rPr>
+              <a:t> </a:t>
+            </a:r>
+            <a:r>
+              <a:rPr sz="3600" b="1" spc="-55" dirty="0">
+                <a:solidFill>
+                  <a:srgbClr val="9BC850"/>
+                </a:solidFill>
+                <a:latin typeface="Arial" panose="020B0604020202020204"/>
+                <a:cs typeface="Arial" panose="020B0604020202020204"/>
+              </a:rPr>
+              <a:t>Deploys</a:t>
+            </a:r>
+            <a:r>
+              <a:rPr sz="3600" b="1" spc="-60" dirty="0">
+                <a:solidFill>
+                  <a:srgbClr val="9BC850"/>
+                </a:solidFill>
+                <a:latin typeface="Arial" panose="020B0604020202020204"/>
+                <a:cs typeface="Arial" panose="020B0604020202020204"/>
+              </a:rPr>
+              <a:t> </a:t>
+            </a:r>
+            <a:r>
+              <a:rPr sz="3600" b="1" spc="110" dirty="0">
+                <a:solidFill>
+                  <a:srgbClr val="9BC850"/>
+                </a:solidFill>
+                <a:latin typeface="Arial" panose="020B0604020202020204"/>
+                <a:cs typeface="Arial" panose="020B0604020202020204"/>
+              </a:rPr>
+              <a:t>the</a:t>
+            </a:r>
+            <a:r>
+              <a:rPr sz="3600" b="1" spc="-60" dirty="0">
+                <a:solidFill>
+                  <a:srgbClr val="9BC850"/>
+                </a:solidFill>
+                <a:latin typeface="Arial" panose="020B0604020202020204"/>
+                <a:cs typeface="Arial" panose="020B0604020202020204"/>
+              </a:rPr>
+              <a:t> </a:t>
+            </a:r>
+            <a:r>
+              <a:rPr sz="3600" b="1" spc="-5" dirty="0">
+                <a:solidFill>
+                  <a:srgbClr val="9BC850"/>
+                </a:solidFill>
+                <a:latin typeface="Arial" panose="020B0604020202020204"/>
+                <a:cs typeface="Arial" panose="020B0604020202020204"/>
+              </a:rPr>
+              <a:t>application</a:t>
+            </a:r>
+            <a:endParaRPr sz="3600">
+              <a:latin typeface="Arial" panose="020B0604020202020204"/>
+              <a:cs typeface="Arial" panose="020B0604020202020204"/>
+            </a:endParaRPr>
+          </a:p>
+          <a:p>
+            <a:pPr marL="12700">
+              <a:lnSpc>
+                <a:spcPct val="100000"/>
+              </a:lnSpc>
+              <a:spcBef>
+                <a:spcPts val="2665"/>
+              </a:spcBef>
+            </a:pPr>
+            <a:r>
+              <a:rPr sz="3600" b="1" spc="-5" dirty="0">
+                <a:solidFill>
+                  <a:srgbClr val="9BC850"/>
+                </a:solidFill>
+                <a:latin typeface="Arial" panose="020B0604020202020204"/>
+                <a:cs typeface="Arial" panose="020B0604020202020204"/>
+              </a:rPr>
+              <a:t>ng</a:t>
+            </a:r>
+            <a:r>
+              <a:rPr sz="3600" b="1" spc="-70" dirty="0">
+                <a:solidFill>
+                  <a:srgbClr val="9BC850"/>
+                </a:solidFill>
+                <a:latin typeface="Arial" panose="020B0604020202020204"/>
+                <a:cs typeface="Arial" panose="020B0604020202020204"/>
+              </a:rPr>
+              <a:t> </a:t>
+            </a:r>
+            <a:r>
+              <a:rPr sz="3600" b="1" spc="45" dirty="0">
+                <a:solidFill>
+                  <a:srgbClr val="9BC850"/>
+                </a:solidFill>
+                <a:latin typeface="Arial" panose="020B0604020202020204"/>
+                <a:cs typeface="Arial" panose="020B0604020202020204"/>
+              </a:rPr>
+              <a:t>update</a:t>
+            </a:r>
+            <a:r>
+              <a:rPr sz="3600" b="1" spc="-55" dirty="0">
+                <a:solidFill>
+                  <a:srgbClr val="9BC850"/>
+                </a:solidFill>
+                <a:latin typeface="Arial" panose="020B0604020202020204"/>
+                <a:cs typeface="Arial" panose="020B0604020202020204"/>
+              </a:rPr>
+              <a:t> </a:t>
+            </a:r>
+            <a:r>
+              <a:rPr sz="3600" b="1" spc="335" dirty="0">
+                <a:solidFill>
+                  <a:srgbClr val="9BC850"/>
+                </a:solidFill>
+                <a:latin typeface="Arial" panose="020B0604020202020204"/>
+                <a:cs typeface="Arial" panose="020B0604020202020204"/>
+              </a:rPr>
+              <a:t>-</a:t>
+            </a:r>
+            <a:r>
+              <a:rPr sz="3600" b="1" spc="-65" dirty="0">
+                <a:solidFill>
+                  <a:srgbClr val="9BC850"/>
+                </a:solidFill>
+                <a:latin typeface="Arial" panose="020B0604020202020204"/>
+                <a:cs typeface="Arial" panose="020B0604020202020204"/>
+              </a:rPr>
+              <a:t> </a:t>
+            </a:r>
+            <a:r>
+              <a:rPr sz="3600" b="1" dirty="0">
+                <a:solidFill>
+                  <a:srgbClr val="9BC850"/>
+                </a:solidFill>
+                <a:latin typeface="Arial" panose="020B0604020202020204"/>
+                <a:cs typeface="Arial" panose="020B0604020202020204"/>
+              </a:rPr>
+              <a:t>Updates</a:t>
+            </a:r>
+            <a:r>
+              <a:rPr sz="3600" b="1" spc="-60" dirty="0">
+                <a:solidFill>
+                  <a:srgbClr val="9BC850"/>
+                </a:solidFill>
+                <a:latin typeface="Arial" panose="020B0604020202020204"/>
+                <a:cs typeface="Arial" panose="020B0604020202020204"/>
+              </a:rPr>
+              <a:t> </a:t>
+            </a:r>
+            <a:r>
+              <a:rPr sz="3600" b="1" spc="110" dirty="0">
+                <a:solidFill>
+                  <a:srgbClr val="9BC850"/>
+                </a:solidFill>
+                <a:latin typeface="Arial" panose="020B0604020202020204"/>
+                <a:cs typeface="Arial" panose="020B0604020202020204"/>
+              </a:rPr>
+              <a:t>the</a:t>
+            </a:r>
+            <a:r>
+              <a:rPr sz="3600" b="1" spc="-60" dirty="0">
+                <a:solidFill>
+                  <a:srgbClr val="9BC850"/>
+                </a:solidFill>
+                <a:latin typeface="Arial" panose="020B0604020202020204"/>
+                <a:cs typeface="Arial" panose="020B0604020202020204"/>
+              </a:rPr>
+              <a:t> Angular </a:t>
+            </a:r>
+            <a:r>
+              <a:rPr sz="3600" b="1" spc="-55" dirty="0">
+                <a:solidFill>
+                  <a:srgbClr val="9BC850"/>
+                </a:solidFill>
+                <a:latin typeface="Arial" panose="020B0604020202020204"/>
+                <a:cs typeface="Arial" panose="020B0604020202020204"/>
+              </a:rPr>
+              <a:t>version</a:t>
+            </a:r>
+            <a:r>
+              <a:rPr sz="3600" b="1" spc="-60" dirty="0">
+                <a:solidFill>
+                  <a:srgbClr val="9BC850"/>
+                </a:solidFill>
+                <a:latin typeface="Arial" panose="020B0604020202020204"/>
+                <a:cs typeface="Arial" panose="020B0604020202020204"/>
+              </a:rPr>
+              <a:t> </a:t>
+            </a:r>
+            <a:r>
+              <a:rPr sz="3600" b="1" spc="-10" dirty="0">
+                <a:solidFill>
+                  <a:srgbClr val="9BC850"/>
+                </a:solidFill>
+                <a:latin typeface="Arial" panose="020B0604020202020204"/>
+                <a:cs typeface="Arial" panose="020B0604020202020204"/>
+              </a:rPr>
+              <a:t>for</a:t>
+            </a:r>
+            <a:r>
+              <a:rPr sz="3600" b="1" spc="-65" dirty="0">
+                <a:solidFill>
+                  <a:srgbClr val="9BC850"/>
+                </a:solidFill>
+                <a:latin typeface="Arial" panose="020B0604020202020204"/>
+                <a:cs typeface="Arial" panose="020B0604020202020204"/>
+              </a:rPr>
+              <a:t> </a:t>
+            </a:r>
+            <a:r>
+              <a:rPr sz="3600" b="1" spc="110" dirty="0">
+                <a:solidFill>
+                  <a:srgbClr val="9BC850"/>
+                </a:solidFill>
+                <a:latin typeface="Arial" panose="020B0604020202020204"/>
+                <a:cs typeface="Arial" panose="020B0604020202020204"/>
+              </a:rPr>
+              <a:t>the</a:t>
+            </a:r>
+            <a:r>
+              <a:rPr sz="3600" b="1" spc="-60" dirty="0">
+                <a:solidFill>
+                  <a:srgbClr val="9BC850"/>
+                </a:solidFill>
+                <a:latin typeface="Arial" panose="020B0604020202020204"/>
+                <a:cs typeface="Arial" panose="020B0604020202020204"/>
+              </a:rPr>
+              <a:t> </a:t>
+            </a:r>
+            <a:r>
+              <a:rPr sz="3600" b="1" spc="5" dirty="0">
+                <a:solidFill>
+                  <a:srgbClr val="9BC850"/>
+                </a:solidFill>
+                <a:latin typeface="Arial" panose="020B0604020202020204"/>
+                <a:cs typeface="Arial" panose="020B0604020202020204"/>
+              </a:rPr>
+              <a:t>app</a:t>
+            </a:r>
+            <a:endParaRPr sz="3600">
+              <a:latin typeface="Arial" panose="020B0604020202020204"/>
+              <a:cs typeface="Arial" panose="020B0604020202020204"/>
+            </a:endParaRPr>
+          </a:p>
+        </p:txBody>
+      </p:sp>
+      <p:sp>
+        <p:nvSpPr>
+          <p:cNvPr id="9" name="Slide Number Placeholder 8"/>
           <p:cNvSpPr>
             <a:spLocks noGrp="1"/>
           </p:cNvSpPr>
@@ -7273,1916 +9086,6 @@
       <p:sp>
         <p:nvSpPr>
           <p:cNvPr id="7" name="object 7"/>
-          <p:cNvSpPr txBox="1">
-            <a:spLocks noGrp="1"/>
-          </p:cNvSpPr>
-          <p:nvPr>
-            <p:ph type="title"/>
-          </p:nvPr>
-        </p:nvSpPr>
-        <p:spPr>
-          <a:xfrm>
-            <a:off x="291896" y="374395"/>
-            <a:ext cx="2559685" cy="1619885"/>
-          </a:xfrm>
-          <a:prstGeom prst="rect">
-            <a:avLst/>
-          </a:prstGeom>
-        </p:spPr>
-        <p:txBody>
-          <a:bodyPr vert="horz" wrap="square" lIns="0" tIns="38100" rIns="0" bIns="0" rtlCol="0">
-            <a:spAutoFit/>
-          </a:bodyPr>
-          <a:lstStyle/>
-          <a:p>
-            <a:pPr marL="12700" marR="5080">
-              <a:lnSpc>
-                <a:spcPct val="95000"/>
-              </a:lnSpc>
-              <a:spcBef>
-                <a:spcPts val="300"/>
-              </a:spcBef>
-            </a:pPr>
-            <a:r>
-              <a:rPr sz="3600" b="1" spc="-60" dirty="0">
-                <a:solidFill>
-                  <a:srgbClr val="727272"/>
-                </a:solidFill>
-                <a:latin typeface="Arial" panose="020B0604020202020204"/>
-                <a:cs typeface="Arial" panose="020B0604020202020204"/>
-              </a:rPr>
-              <a:t>Angular</a:t>
-            </a:r>
-            <a:r>
-              <a:rPr sz="3600" b="1" spc="-130" dirty="0">
-                <a:solidFill>
-                  <a:srgbClr val="727272"/>
-                </a:solidFill>
-                <a:latin typeface="Arial" panose="020B0604020202020204"/>
-                <a:cs typeface="Arial" panose="020B0604020202020204"/>
-              </a:rPr>
-              <a:t> </a:t>
-            </a:r>
-            <a:r>
-              <a:rPr sz="3600" b="1" spc="-5" dirty="0">
-                <a:solidFill>
-                  <a:srgbClr val="727272"/>
-                </a:solidFill>
-                <a:latin typeface="Arial" panose="020B0604020202020204"/>
-                <a:cs typeface="Arial" panose="020B0604020202020204"/>
-              </a:rPr>
-              <a:t>CLI </a:t>
-            </a:r>
-            <a:r>
-              <a:rPr sz="3600" b="1" spc="-985" dirty="0">
-                <a:solidFill>
-                  <a:srgbClr val="727272"/>
-                </a:solidFill>
-                <a:latin typeface="Arial" panose="020B0604020202020204"/>
-                <a:cs typeface="Arial" panose="020B0604020202020204"/>
-              </a:rPr>
-              <a:t> </a:t>
-            </a:r>
-            <a:r>
-              <a:rPr sz="3600" b="1" spc="-40" dirty="0">
-                <a:solidFill>
-                  <a:srgbClr val="727272"/>
-                </a:solidFill>
-                <a:latin typeface="Arial" panose="020B0604020202020204"/>
-                <a:cs typeface="Arial" panose="020B0604020202020204"/>
-              </a:rPr>
-              <a:t>Checklist: </a:t>
-            </a:r>
-            <a:r>
-              <a:rPr sz="3600" b="1" spc="-35" dirty="0">
-                <a:solidFill>
-                  <a:srgbClr val="727272"/>
-                </a:solidFill>
-                <a:latin typeface="Arial" panose="020B0604020202020204"/>
-                <a:cs typeface="Arial" panose="020B0604020202020204"/>
-              </a:rPr>
-              <a:t> </a:t>
-            </a:r>
-            <a:r>
-              <a:rPr sz="3600" b="1" spc="-55" dirty="0">
-                <a:solidFill>
-                  <a:srgbClr val="FFFFFF"/>
-                </a:solidFill>
-                <a:latin typeface="Arial" panose="020B0604020202020204"/>
-                <a:cs typeface="Arial" panose="020B0604020202020204"/>
-              </a:rPr>
-              <a:t>Commands</a:t>
-            </a:r>
-            <a:endParaRPr sz="3600">
-              <a:latin typeface="Arial" panose="020B0604020202020204"/>
-              <a:cs typeface="Arial" panose="020B0604020202020204"/>
-            </a:endParaRPr>
-          </a:p>
-        </p:txBody>
-      </p:sp>
-      <p:sp>
-        <p:nvSpPr>
-          <p:cNvPr id="8" name="object 8"/>
-          <p:cNvSpPr txBox="1"/>
-          <p:nvPr/>
-        </p:nvSpPr>
-        <p:spPr>
-          <a:xfrm>
-            <a:off x="4072049" y="831595"/>
-            <a:ext cx="11957685" cy="8587740"/>
-          </a:xfrm>
-          <a:prstGeom prst="rect">
-            <a:avLst/>
-          </a:prstGeom>
-        </p:spPr>
-        <p:txBody>
-          <a:bodyPr vert="horz" wrap="square" lIns="0" tIns="12700" rIns="0" bIns="0" rtlCol="0">
-            <a:spAutoFit/>
-          </a:bodyPr>
-          <a:lstStyle/>
-          <a:p>
-            <a:pPr marL="12700">
-              <a:lnSpc>
-                <a:spcPct val="100000"/>
-              </a:lnSpc>
-              <a:spcBef>
-                <a:spcPts val="100"/>
-              </a:spcBef>
-            </a:pPr>
-            <a:r>
-              <a:rPr sz="3600" b="1" spc="-5" dirty="0">
-                <a:solidFill>
-                  <a:srgbClr val="9BC850"/>
-                </a:solidFill>
-                <a:latin typeface="Arial" panose="020B0604020202020204"/>
-                <a:cs typeface="Arial" panose="020B0604020202020204"/>
-              </a:rPr>
-              <a:t>ng</a:t>
-            </a:r>
-            <a:r>
-              <a:rPr sz="3600" b="1" spc="-75" dirty="0">
-                <a:solidFill>
-                  <a:srgbClr val="9BC850"/>
-                </a:solidFill>
-                <a:latin typeface="Arial" panose="020B0604020202020204"/>
-                <a:cs typeface="Arial" panose="020B0604020202020204"/>
-              </a:rPr>
-              <a:t> </a:t>
-            </a:r>
-            <a:r>
-              <a:rPr sz="3600" b="1" spc="15" dirty="0">
-                <a:solidFill>
-                  <a:srgbClr val="9BC850"/>
-                </a:solidFill>
-                <a:latin typeface="Arial" panose="020B0604020202020204"/>
-                <a:cs typeface="Arial" panose="020B0604020202020204"/>
-              </a:rPr>
-              <a:t>help</a:t>
-            </a:r>
-            <a:r>
-              <a:rPr sz="3600" b="1" spc="-70" dirty="0">
-                <a:solidFill>
-                  <a:srgbClr val="9BC850"/>
-                </a:solidFill>
-                <a:latin typeface="Arial" panose="020B0604020202020204"/>
-                <a:cs typeface="Arial" panose="020B0604020202020204"/>
-              </a:rPr>
-              <a:t> </a:t>
-            </a:r>
-            <a:r>
-              <a:rPr sz="3600" b="1" spc="335" dirty="0">
-                <a:solidFill>
-                  <a:srgbClr val="9BC850"/>
-                </a:solidFill>
-                <a:latin typeface="Arial" panose="020B0604020202020204"/>
-                <a:cs typeface="Arial" panose="020B0604020202020204"/>
-              </a:rPr>
-              <a:t>-</a:t>
-            </a:r>
-            <a:r>
-              <a:rPr sz="3600" b="1" spc="-70" dirty="0">
-                <a:solidFill>
-                  <a:srgbClr val="9BC850"/>
-                </a:solidFill>
-                <a:latin typeface="Arial" panose="020B0604020202020204"/>
-                <a:cs typeface="Arial" panose="020B0604020202020204"/>
-              </a:rPr>
-              <a:t> </a:t>
-            </a:r>
-            <a:r>
-              <a:rPr sz="3600" b="1" spc="-100" dirty="0">
-                <a:solidFill>
-                  <a:srgbClr val="9BC850"/>
-                </a:solidFill>
-                <a:latin typeface="Arial" panose="020B0604020202020204"/>
-                <a:cs typeface="Arial" panose="020B0604020202020204"/>
-              </a:rPr>
-              <a:t>Displays</a:t>
-            </a:r>
-            <a:r>
-              <a:rPr sz="3600" b="1" spc="-65" dirty="0">
-                <a:solidFill>
-                  <a:srgbClr val="9BC850"/>
-                </a:solidFill>
-                <a:latin typeface="Arial" panose="020B0604020202020204"/>
-                <a:cs typeface="Arial" panose="020B0604020202020204"/>
-              </a:rPr>
-              <a:t> </a:t>
-            </a:r>
-            <a:r>
-              <a:rPr sz="3600" b="1" spc="-30" dirty="0">
-                <a:solidFill>
-                  <a:srgbClr val="9BC850"/>
-                </a:solidFill>
-                <a:latin typeface="Arial" panose="020B0604020202020204"/>
-                <a:cs typeface="Arial" panose="020B0604020202020204"/>
-              </a:rPr>
-              <a:t>available</a:t>
-            </a:r>
-            <a:r>
-              <a:rPr sz="3600" b="1" spc="-65" dirty="0">
-                <a:solidFill>
-                  <a:srgbClr val="9BC850"/>
-                </a:solidFill>
-                <a:latin typeface="Arial" panose="020B0604020202020204"/>
-                <a:cs typeface="Arial" panose="020B0604020202020204"/>
-              </a:rPr>
-              <a:t> </a:t>
-            </a:r>
-            <a:r>
-              <a:rPr sz="3600" b="1" spc="-55" dirty="0">
-                <a:solidFill>
-                  <a:srgbClr val="9BC850"/>
-                </a:solidFill>
-                <a:latin typeface="Arial" panose="020B0604020202020204"/>
-                <a:cs typeface="Arial" panose="020B0604020202020204"/>
-              </a:rPr>
-              <a:t>commands</a:t>
-            </a:r>
-            <a:endParaRPr sz="3600">
-              <a:latin typeface="Arial" panose="020B0604020202020204"/>
-              <a:cs typeface="Arial" panose="020B0604020202020204"/>
-            </a:endParaRPr>
-          </a:p>
-          <a:p>
-            <a:pPr marL="12700">
-              <a:lnSpc>
-                <a:spcPct val="100000"/>
-              </a:lnSpc>
-              <a:spcBef>
-                <a:spcPts val="2685"/>
-              </a:spcBef>
-            </a:pPr>
-            <a:r>
-              <a:rPr sz="3600" b="1" spc="-5" dirty="0">
-                <a:solidFill>
-                  <a:srgbClr val="9BC850"/>
-                </a:solidFill>
-                <a:latin typeface="Arial" panose="020B0604020202020204"/>
-                <a:cs typeface="Arial" panose="020B0604020202020204"/>
-              </a:rPr>
-              <a:t>ng</a:t>
-            </a:r>
-            <a:r>
-              <a:rPr sz="3600" b="1" spc="-75" dirty="0">
-                <a:solidFill>
-                  <a:srgbClr val="9BC850"/>
-                </a:solidFill>
-                <a:latin typeface="Arial" panose="020B0604020202020204"/>
-                <a:cs typeface="Arial" panose="020B0604020202020204"/>
-              </a:rPr>
-              <a:t> </a:t>
-            </a:r>
-            <a:r>
-              <a:rPr sz="3600" b="1" spc="45" dirty="0">
-                <a:solidFill>
-                  <a:srgbClr val="9BC850"/>
-                </a:solidFill>
-                <a:latin typeface="Arial" panose="020B0604020202020204"/>
-                <a:cs typeface="Arial" panose="020B0604020202020204"/>
-              </a:rPr>
-              <a:t>new</a:t>
-            </a:r>
-            <a:r>
-              <a:rPr sz="3600" b="1" spc="-70" dirty="0">
-                <a:solidFill>
-                  <a:srgbClr val="9BC850"/>
-                </a:solidFill>
-                <a:latin typeface="Arial" panose="020B0604020202020204"/>
-                <a:cs typeface="Arial" panose="020B0604020202020204"/>
-              </a:rPr>
-              <a:t> </a:t>
-            </a:r>
-            <a:r>
-              <a:rPr sz="3600" b="1" spc="335" dirty="0">
-                <a:solidFill>
-                  <a:srgbClr val="9BC850"/>
-                </a:solidFill>
-                <a:latin typeface="Arial" panose="020B0604020202020204"/>
-                <a:cs typeface="Arial" panose="020B0604020202020204"/>
-              </a:rPr>
-              <a:t>-</a:t>
-            </a:r>
-            <a:r>
-              <a:rPr sz="3600" b="1" spc="-70" dirty="0">
-                <a:solidFill>
-                  <a:srgbClr val="9BC850"/>
-                </a:solidFill>
-                <a:latin typeface="Arial" panose="020B0604020202020204"/>
-                <a:cs typeface="Arial" panose="020B0604020202020204"/>
-              </a:rPr>
-              <a:t> </a:t>
-            </a:r>
-            <a:r>
-              <a:rPr sz="3600" b="1" spc="20" dirty="0">
-                <a:solidFill>
-                  <a:srgbClr val="9BC850"/>
-                </a:solidFill>
-                <a:latin typeface="Arial" panose="020B0604020202020204"/>
-                <a:cs typeface="Arial" panose="020B0604020202020204"/>
-              </a:rPr>
-              <a:t>Creates</a:t>
-            </a:r>
-            <a:r>
-              <a:rPr sz="3600" b="1" spc="-65" dirty="0">
-                <a:solidFill>
-                  <a:srgbClr val="9BC850"/>
-                </a:solidFill>
-                <a:latin typeface="Arial" panose="020B0604020202020204"/>
-                <a:cs typeface="Arial" panose="020B0604020202020204"/>
-              </a:rPr>
-              <a:t> </a:t>
-            </a:r>
-            <a:r>
-              <a:rPr sz="3600" b="1" spc="-30" dirty="0">
-                <a:solidFill>
-                  <a:srgbClr val="9BC850"/>
-                </a:solidFill>
-                <a:latin typeface="Arial" panose="020B0604020202020204"/>
-                <a:cs typeface="Arial" panose="020B0604020202020204"/>
-              </a:rPr>
-              <a:t>a</a:t>
-            </a:r>
-            <a:r>
-              <a:rPr sz="3600" b="1" spc="-70" dirty="0">
-                <a:solidFill>
-                  <a:srgbClr val="9BC850"/>
-                </a:solidFill>
-                <a:latin typeface="Arial" panose="020B0604020202020204"/>
-                <a:cs typeface="Arial" panose="020B0604020202020204"/>
-              </a:rPr>
-              <a:t> </a:t>
-            </a:r>
-            <a:r>
-              <a:rPr sz="3600" b="1" spc="40" dirty="0">
-                <a:solidFill>
-                  <a:srgbClr val="9BC850"/>
-                </a:solidFill>
-                <a:latin typeface="Arial" panose="020B0604020202020204"/>
-                <a:cs typeface="Arial" panose="020B0604020202020204"/>
-              </a:rPr>
-              <a:t>new</a:t>
-            </a:r>
-            <a:r>
-              <a:rPr sz="3600" b="1" spc="-70" dirty="0">
-                <a:solidFill>
-                  <a:srgbClr val="9BC850"/>
-                </a:solidFill>
-                <a:latin typeface="Arial" panose="020B0604020202020204"/>
-                <a:cs typeface="Arial" panose="020B0604020202020204"/>
-              </a:rPr>
-              <a:t> </a:t>
-            </a:r>
-            <a:r>
-              <a:rPr sz="3600" b="1" spc="-60" dirty="0">
-                <a:solidFill>
-                  <a:srgbClr val="9BC850"/>
-                </a:solidFill>
-                <a:latin typeface="Arial" panose="020B0604020202020204"/>
-                <a:cs typeface="Arial" panose="020B0604020202020204"/>
-              </a:rPr>
-              <a:t>Angular</a:t>
-            </a:r>
-            <a:r>
-              <a:rPr sz="3600" b="1" spc="-70" dirty="0">
-                <a:solidFill>
-                  <a:srgbClr val="9BC850"/>
-                </a:solidFill>
-                <a:latin typeface="Arial" panose="020B0604020202020204"/>
-                <a:cs typeface="Arial" panose="020B0604020202020204"/>
-              </a:rPr>
-              <a:t> </a:t>
-            </a:r>
-            <a:r>
-              <a:rPr sz="3600" b="1" dirty="0">
-                <a:solidFill>
-                  <a:srgbClr val="9BC850"/>
-                </a:solidFill>
-                <a:latin typeface="Arial" panose="020B0604020202020204"/>
-                <a:cs typeface="Arial" panose="020B0604020202020204"/>
-              </a:rPr>
-              <a:t>application</a:t>
-            </a:r>
-            <a:endParaRPr sz="3600">
-              <a:latin typeface="Arial" panose="020B0604020202020204"/>
-              <a:cs typeface="Arial" panose="020B0604020202020204"/>
-            </a:endParaRPr>
-          </a:p>
-          <a:p>
-            <a:pPr marL="12700" marR="1685925">
-              <a:lnSpc>
-                <a:spcPts val="7010"/>
-              </a:lnSpc>
-              <a:spcBef>
-                <a:spcPts val="660"/>
-              </a:spcBef>
-            </a:pPr>
-            <a:r>
-              <a:rPr sz="3600" b="1" spc="-5" dirty="0">
-                <a:solidFill>
-                  <a:srgbClr val="9BC850"/>
-                </a:solidFill>
-                <a:latin typeface="Arial" panose="020B0604020202020204"/>
-                <a:cs typeface="Arial" panose="020B0604020202020204"/>
-              </a:rPr>
-              <a:t>ng</a:t>
-            </a:r>
-            <a:r>
-              <a:rPr sz="3600" b="1" spc="-75" dirty="0">
-                <a:solidFill>
-                  <a:srgbClr val="9BC850"/>
-                </a:solidFill>
-                <a:latin typeface="Arial" panose="020B0604020202020204"/>
-                <a:cs typeface="Arial" panose="020B0604020202020204"/>
-              </a:rPr>
-              <a:t> </a:t>
-            </a:r>
-            <a:r>
-              <a:rPr sz="3600" b="1" spc="-25" dirty="0">
-                <a:solidFill>
-                  <a:srgbClr val="9BC850"/>
-                </a:solidFill>
-                <a:latin typeface="Arial" panose="020B0604020202020204"/>
-                <a:cs typeface="Arial" panose="020B0604020202020204"/>
-              </a:rPr>
-              <a:t>serve</a:t>
-            </a:r>
-            <a:r>
-              <a:rPr sz="3600" b="1" spc="-65" dirty="0">
-                <a:solidFill>
-                  <a:srgbClr val="9BC850"/>
-                </a:solidFill>
-                <a:latin typeface="Arial" panose="020B0604020202020204"/>
-                <a:cs typeface="Arial" panose="020B0604020202020204"/>
-              </a:rPr>
-              <a:t> </a:t>
-            </a:r>
-            <a:r>
-              <a:rPr sz="3600" b="1" spc="335" dirty="0">
-                <a:solidFill>
-                  <a:srgbClr val="9BC850"/>
-                </a:solidFill>
-                <a:latin typeface="Arial" panose="020B0604020202020204"/>
-                <a:cs typeface="Arial" panose="020B0604020202020204"/>
-              </a:rPr>
-              <a:t>-</a:t>
-            </a:r>
-            <a:r>
-              <a:rPr sz="3600" b="1" spc="-65" dirty="0">
-                <a:solidFill>
-                  <a:srgbClr val="9BC850"/>
-                </a:solidFill>
-                <a:latin typeface="Arial" panose="020B0604020202020204"/>
-                <a:cs typeface="Arial" panose="020B0604020202020204"/>
-              </a:rPr>
-              <a:t> </a:t>
-            </a:r>
-            <a:r>
-              <a:rPr sz="3600" b="1" spc="-100" dirty="0">
-                <a:solidFill>
-                  <a:srgbClr val="9BC850"/>
-                </a:solidFill>
-                <a:latin typeface="Arial" panose="020B0604020202020204"/>
-                <a:cs typeface="Arial" panose="020B0604020202020204"/>
-              </a:rPr>
-              <a:t>Builds</a:t>
-            </a:r>
-            <a:r>
-              <a:rPr sz="3600" b="1" spc="-65" dirty="0">
-                <a:solidFill>
-                  <a:srgbClr val="9BC850"/>
-                </a:solidFill>
-                <a:latin typeface="Arial" panose="020B0604020202020204"/>
-                <a:cs typeface="Arial" panose="020B0604020202020204"/>
-              </a:rPr>
-              <a:t> </a:t>
-            </a:r>
-            <a:r>
-              <a:rPr sz="3600" b="1" spc="110" dirty="0">
-                <a:solidFill>
-                  <a:srgbClr val="9BC850"/>
-                </a:solidFill>
-                <a:latin typeface="Arial" panose="020B0604020202020204"/>
-                <a:cs typeface="Arial" panose="020B0604020202020204"/>
-              </a:rPr>
-              <a:t>the</a:t>
-            </a:r>
-            <a:r>
-              <a:rPr sz="3600" b="1" spc="-65" dirty="0">
-                <a:solidFill>
-                  <a:srgbClr val="9BC850"/>
-                </a:solidFill>
-                <a:latin typeface="Arial" panose="020B0604020202020204"/>
-                <a:cs typeface="Arial" panose="020B0604020202020204"/>
-              </a:rPr>
-              <a:t> </a:t>
-            </a:r>
-            <a:r>
-              <a:rPr sz="3600" b="1" spc="5" dirty="0">
-                <a:solidFill>
-                  <a:srgbClr val="9BC850"/>
-                </a:solidFill>
-                <a:latin typeface="Arial" panose="020B0604020202020204"/>
-                <a:cs typeface="Arial" panose="020B0604020202020204"/>
-              </a:rPr>
-              <a:t>app</a:t>
-            </a:r>
-            <a:r>
-              <a:rPr sz="3600" b="1" spc="-65" dirty="0">
-                <a:solidFill>
-                  <a:srgbClr val="9BC850"/>
-                </a:solidFill>
-                <a:latin typeface="Arial" panose="020B0604020202020204"/>
-                <a:cs typeface="Arial" panose="020B0604020202020204"/>
-              </a:rPr>
-              <a:t> </a:t>
-            </a:r>
-            <a:r>
-              <a:rPr sz="3600" b="1" spc="-10" dirty="0">
-                <a:solidFill>
-                  <a:srgbClr val="9BC850"/>
-                </a:solidFill>
-                <a:latin typeface="Arial" panose="020B0604020202020204"/>
-                <a:cs typeface="Arial" panose="020B0604020202020204"/>
-              </a:rPr>
-              <a:t>and</a:t>
-            </a:r>
-            <a:r>
-              <a:rPr sz="3600" b="1" spc="-70" dirty="0">
-                <a:solidFill>
-                  <a:srgbClr val="9BC850"/>
-                </a:solidFill>
-                <a:latin typeface="Arial" panose="020B0604020202020204"/>
-                <a:cs typeface="Arial" panose="020B0604020202020204"/>
-              </a:rPr>
-              <a:t> </a:t>
-            </a:r>
-            <a:r>
-              <a:rPr sz="3600" b="1" spc="-25" dirty="0">
-                <a:solidFill>
-                  <a:srgbClr val="9BC850"/>
-                </a:solidFill>
-                <a:latin typeface="Arial" panose="020B0604020202020204"/>
-                <a:cs typeface="Arial" panose="020B0604020202020204"/>
-              </a:rPr>
-              <a:t>launches</a:t>
-            </a:r>
-            <a:r>
-              <a:rPr sz="3600" b="1" spc="-60" dirty="0">
-                <a:solidFill>
-                  <a:srgbClr val="9BC850"/>
-                </a:solidFill>
-                <a:latin typeface="Arial" panose="020B0604020202020204"/>
-                <a:cs typeface="Arial" panose="020B0604020202020204"/>
-              </a:rPr>
-              <a:t> </a:t>
-            </a:r>
-            <a:r>
-              <a:rPr sz="3600" b="1" spc="-30" dirty="0">
-                <a:solidFill>
-                  <a:srgbClr val="9BC850"/>
-                </a:solidFill>
-                <a:latin typeface="Arial" panose="020B0604020202020204"/>
-                <a:cs typeface="Arial" panose="020B0604020202020204"/>
-              </a:rPr>
-              <a:t>a</a:t>
-            </a:r>
-            <a:r>
-              <a:rPr sz="3600" b="1" spc="-70" dirty="0">
-                <a:solidFill>
-                  <a:srgbClr val="9BC850"/>
-                </a:solidFill>
-                <a:latin typeface="Arial" panose="020B0604020202020204"/>
-                <a:cs typeface="Arial" panose="020B0604020202020204"/>
-              </a:rPr>
-              <a:t> </a:t>
-            </a:r>
-            <a:r>
-              <a:rPr sz="3600" b="1" spc="-30" dirty="0">
-                <a:solidFill>
-                  <a:srgbClr val="9BC850"/>
-                </a:solidFill>
-                <a:latin typeface="Arial" panose="020B0604020202020204"/>
-                <a:cs typeface="Arial" panose="020B0604020202020204"/>
-              </a:rPr>
-              <a:t>server </a:t>
-            </a:r>
-            <a:r>
-              <a:rPr sz="3600" b="1" spc="-985" dirty="0">
-                <a:solidFill>
-                  <a:srgbClr val="9BC850"/>
-                </a:solidFill>
-                <a:latin typeface="Arial" panose="020B0604020202020204"/>
-                <a:cs typeface="Arial" panose="020B0604020202020204"/>
-              </a:rPr>
-              <a:t> </a:t>
-            </a:r>
-            <a:r>
-              <a:rPr sz="3600" b="1" spc="-5" dirty="0">
-                <a:solidFill>
-                  <a:srgbClr val="9BC850"/>
-                </a:solidFill>
-                <a:latin typeface="Arial" panose="020B0604020202020204"/>
-                <a:cs typeface="Arial" panose="020B0604020202020204"/>
-              </a:rPr>
-              <a:t>ng</a:t>
-            </a:r>
-            <a:r>
-              <a:rPr sz="3600" b="1" spc="-75" dirty="0">
-                <a:solidFill>
-                  <a:srgbClr val="9BC850"/>
-                </a:solidFill>
-                <a:latin typeface="Arial" panose="020B0604020202020204"/>
-                <a:cs typeface="Arial" panose="020B0604020202020204"/>
-              </a:rPr>
-              <a:t> </a:t>
-            </a:r>
-            <a:r>
-              <a:rPr sz="3600" b="1" spc="50" dirty="0">
-                <a:solidFill>
-                  <a:srgbClr val="9BC850"/>
-                </a:solidFill>
-                <a:latin typeface="Arial" panose="020B0604020202020204"/>
-                <a:cs typeface="Arial" panose="020B0604020202020204"/>
-              </a:rPr>
-              <a:t>generate</a:t>
-            </a:r>
-            <a:r>
-              <a:rPr sz="3600" b="1" spc="-60" dirty="0">
-                <a:solidFill>
-                  <a:srgbClr val="9BC850"/>
-                </a:solidFill>
-                <a:latin typeface="Arial" panose="020B0604020202020204"/>
-                <a:cs typeface="Arial" panose="020B0604020202020204"/>
-              </a:rPr>
-              <a:t> </a:t>
-            </a:r>
-            <a:r>
-              <a:rPr sz="3600" b="1" spc="335" dirty="0">
-                <a:solidFill>
-                  <a:srgbClr val="9BC850"/>
-                </a:solidFill>
-                <a:latin typeface="Arial" panose="020B0604020202020204"/>
-                <a:cs typeface="Arial" panose="020B0604020202020204"/>
-              </a:rPr>
-              <a:t>-</a:t>
-            </a:r>
-            <a:r>
-              <a:rPr sz="3600" b="1" spc="-65" dirty="0">
-                <a:solidFill>
-                  <a:srgbClr val="9BC850"/>
-                </a:solidFill>
-                <a:latin typeface="Arial" panose="020B0604020202020204"/>
-                <a:cs typeface="Arial" panose="020B0604020202020204"/>
-              </a:rPr>
-              <a:t> </a:t>
-            </a:r>
-            <a:r>
-              <a:rPr sz="3600" b="1" spc="15" dirty="0">
-                <a:solidFill>
-                  <a:srgbClr val="9BC850"/>
-                </a:solidFill>
-                <a:latin typeface="Arial" panose="020B0604020202020204"/>
-                <a:cs typeface="Arial" panose="020B0604020202020204"/>
-              </a:rPr>
-              <a:t>Generates</a:t>
-            </a:r>
-            <a:r>
-              <a:rPr sz="3600" b="1" spc="-60" dirty="0">
-                <a:solidFill>
-                  <a:srgbClr val="9BC850"/>
-                </a:solidFill>
-                <a:latin typeface="Arial" panose="020B0604020202020204"/>
-                <a:cs typeface="Arial" panose="020B0604020202020204"/>
-              </a:rPr>
-              <a:t> </a:t>
-            </a:r>
-            <a:r>
-              <a:rPr sz="3600" b="1" spc="40" dirty="0">
-                <a:solidFill>
-                  <a:srgbClr val="9BC850"/>
-                </a:solidFill>
-                <a:latin typeface="Arial" panose="020B0604020202020204"/>
-                <a:cs typeface="Arial" panose="020B0604020202020204"/>
-              </a:rPr>
-              <a:t>code</a:t>
-            </a:r>
-            <a:endParaRPr sz="3600">
-              <a:latin typeface="Arial" panose="020B0604020202020204"/>
-              <a:cs typeface="Arial" panose="020B0604020202020204"/>
-            </a:endParaRPr>
-          </a:p>
-          <a:p>
-            <a:pPr marL="12700">
-              <a:lnSpc>
-                <a:spcPct val="100000"/>
-              </a:lnSpc>
-              <a:spcBef>
-                <a:spcPts val="2000"/>
-              </a:spcBef>
-            </a:pPr>
-            <a:r>
-              <a:rPr sz="3600" b="1" spc="-5" dirty="0">
-                <a:solidFill>
-                  <a:srgbClr val="9BC850"/>
-                </a:solidFill>
-                <a:latin typeface="Arial" panose="020B0604020202020204"/>
-                <a:cs typeface="Arial" panose="020B0604020202020204"/>
-              </a:rPr>
-              <a:t>ng</a:t>
-            </a:r>
-            <a:r>
-              <a:rPr sz="3600" b="1" spc="-70" dirty="0">
-                <a:solidFill>
-                  <a:srgbClr val="9BC850"/>
-                </a:solidFill>
-                <a:latin typeface="Arial" panose="020B0604020202020204"/>
-                <a:cs typeface="Arial" panose="020B0604020202020204"/>
-              </a:rPr>
-              <a:t> </a:t>
-            </a:r>
-            <a:r>
-              <a:rPr sz="3600" b="1" spc="5" dirty="0">
-                <a:solidFill>
-                  <a:srgbClr val="9BC850"/>
-                </a:solidFill>
-                <a:latin typeface="Arial" panose="020B0604020202020204"/>
-                <a:cs typeface="Arial" panose="020B0604020202020204"/>
-              </a:rPr>
-              <a:t>add</a:t>
-            </a:r>
-            <a:r>
-              <a:rPr sz="3600" b="1" spc="-60" dirty="0">
-                <a:solidFill>
-                  <a:srgbClr val="9BC850"/>
-                </a:solidFill>
-                <a:latin typeface="Arial" panose="020B0604020202020204"/>
-                <a:cs typeface="Arial" panose="020B0604020202020204"/>
-              </a:rPr>
-              <a:t> </a:t>
-            </a:r>
-            <a:r>
-              <a:rPr sz="3600" b="1" spc="335" dirty="0">
-                <a:solidFill>
-                  <a:srgbClr val="9BC850"/>
-                </a:solidFill>
-                <a:latin typeface="Arial" panose="020B0604020202020204"/>
-                <a:cs typeface="Arial" panose="020B0604020202020204"/>
-              </a:rPr>
-              <a:t>-</a:t>
-            </a:r>
-            <a:r>
-              <a:rPr sz="3600" b="1" spc="-65" dirty="0">
-                <a:solidFill>
-                  <a:srgbClr val="9BC850"/>
-                </a:solidFill>
-                <a:latin typeface="Arial" panose="020B0604020202020204"/>
-                <a:cs typeface="Arial" panose="020B0604020202020204"/>
-              </a:rPr>
-              <a:t> </a:t>
-            </a:r>
-            <a:r>
-              <a:rPr sz="3600" b="1" spc="-110" dirty="0">
-                <a:solidFill>
-                  <a:srgbClr val="9BC850"/>
-                </a:solidFill>
-                <a:latin typeface="Arial" panose="020B0604020202020204"/>
-                <a:cs typeface="Arial" panose="020B0604020202020204"/>
-              </a:rPr>
-              <a:t>Adds</a:t>
-            </a:r>
-            <a:r>
-              <a:rPr sz="3600" b="1" spc="-60" dirty="0">
-                <a:solidFill>
-                  <a:srgbClr val="9BC850"/>
-                </a:solidFill>
-                <a:latin typeface="Arial" panose="020B0604020202020204"/>
-                <a:cs typeface="Arial" panose="020B0604020202020204"/>
-              </a:rPr>
-              <a:t> </a:t>
-            </a:r>
-            <a:r>
-              <a:rPr sz="3600" b="1" spc="-10" dirty="0">
-                <a:solidFill>
-                  <a:srgbClr val="9BC850"/>
-                </a:solidFill>
-                <a:latin typeface="Arial" panose="020B0604020202020204"/>
-                <a:cs typeface="Arial" panose="020B0604020202020204"/>
-              </a:rPr>
-              <a:t>support</a:t>
-            </a:r>
-            <a:r>
-              <a:rPr sz="3600" b="1" spc="-60" dirty="0">
-                <a:solidFill>
-                  <a:srgbClr val="9BC850"/>
-                </a:solidFill>
-                <a:latin typeface="Arial" panose="020B0604020202020204"/>
-                <a:cs typeface="Arial" panose="020B0604020202020204"/>
-              </a:rPr>
-              <a:t> </a:t>
-            </a:r>
-            <a:r>
-              <a:rPr sz="3600" b="1" spc="-10" dirty="0">
-                <a:solidFill>
-                  <a:srgbClr val="9BC850"/>
-                </a:solidFill>
-                <a:latin typeface="Arial" panose="020B0604020202020204"/>
-                <a:cs typeface="Arial" panose="020B0604020202020204"/>
-              </a:rPr>
-              <a:t>for</a:t>
-            </a:r>
-            <a:r>
-              <a:rPr sz="3600" b="1" spc="-65" dirty="0">
-                <a:solidFill>
-                  <a:srgbClr val="9BC850"/>
-                </a:solidFill>
-                <a:latin typeface="Arial" panose="020B0604020202020204"/>
-                <a:cs typeface="Arial" panose="020B0604020202020204"/>
-              </a:rPr>
-              <a:t> </a:t>
-            </a:r>
-            <a:r>
-              <a:rPr sz="3600" b="1" spc="-25" dirty="0">
-                <a:solidFill>
-                  <a:srgbClr val="9BC850"/>
-                </a:solidFill>
-                <a:latin typeface="Arial" panose="020B0604020202020204"/>
-                <a:cs typeface="Arial" panose="020B0604020202020204"/>
-              </a:rPr>
-              <a:t>an</a:t>
-            </a:r>
-            <a:r>
-              <a:rPr sz="3600" b="1" spc="-60" dirty="0">
-                <a:solidFill>
-                  <a:srgbClr val="9BC850"/>
-                </a:solidFill>
-                <a:latin typeface="Arial" panose="020B0604020202020204"/>
-                <a:cs typeface="Arial" panose="020B0604020202020204"/>
-              </a:rPr>
-              <a:t> </a:t>
-            </a:r>
-            <a:r>
-              <a:rPr sz="3600" b="1" spc="15" dirty="0">
-                <a:solidFill>
-                  <a:srgbClr val="9BC850"/>
-                </a:solidFill>
-                <a:latin typeface="Arial" panose="020B0604020202020204"/>
-                <a:cs typeface="Arial" panose="020B0604020202020204"/>
-              </a:rPr>
-              <a:t>external</a:t>
-            </a:r>
-            <a:r>
-              <a:rPr sz="3600" b="1" spc="-65" dirty="0">
-                <a:solidFill>
-                  <a:srgbClr val="9BC850"/>
-                </a:solidFill>
-                <a:latin typeface="Arial" panose="020B0604020202020204"/>
-                <a:cs typeface="Arial" panose="020B0604020202020204"/>
-              </a:rPr>
-              <a:t> </a:t>
-            </a:r>
-            <a:r>
-              <a:rPr sz="3600" b="1" spc="-45" dirty="0">
-                <a:solidFill>
-                  <a:srgbClr val="9BC850"/>
-                </a:solidFill>
-                <a:latin typeface="Arial" panose="020B0604020202020204"/>
-                <a:cs typeface="Arial" panose="020B0604020202020204"/>
-              </a:rPr>
-              <a:t>library</a:t>
-            </a:r>
-            <a:r>
-              <a:rPr sz="3600" b="1" spc="-70" dirty="0">
-                <a:solidFill>
-                  <a:srgbClr val="9BC850"/>
-                </a:solidFill>
-                <a:latin typeface="Arial" panose="020B0604020202020204"/>
-                <a:cs typeface="Arial" panose="020B0604020202020204"/>
-              </a:rPr>
-              <a:t> </a:t>
-            </a:r>
-            <a:r>
-              <a:rPr sz="3600" b="1" spc="75" dirty="0">
-                <a:solidFill>
-                  <a:srgbClr val="9BC850"/>
-                </a:solidFill>
-                <a:latin typeface="Arial" panose="020B0604020202020204"/>
-                <a:cs typeface="Arial" panose="020B0604020202020204"/>
-              </a:rPr>
-              <a:t>to</a:t>
-            </a:r>
-            <a:r>
-              <a:rPr sz="3600" b="1" spc="-65" dirty="0">
-                <a:solidFill>
-                  <a:srgbClr val="9BC850"/>
-                </a:solidFill>
-                <a:latin typeface="Arial" panose="020B0604020202020204"/>
-                <a:cs typeface="Arial" panose="020B0604020202020204"/>
-              </a:rPr>
-              <a:t> </a:t>
-            </a:r>
-            <a:r>
-              <a:rPr sz="3600" b="1" spc="110" dirty="0">
-                <a:solidFill>
-                  <a:srgbClr val="9BC850"/>
-                </a:solidFill>
-                <a:latin typeface="Arial" panose="020B0604020202020204"/>
-                <a:cs typeface="Arial" panose="020B0604020202020204"/>
-              </a:rPr>
-              <a:t>the</a:t>
-            </a:r>
-            <a:r>
-              <a:rPr sz="3600" b="1" spc="-60" dirty="0">
-                <a:solidFill>
-                  <a:srgbClr val="9BC850"/>
-                </a:solidFill>
-                <a:latin typeface="Arial" panose="020B0604020202020204"/>
-                <a:cs typeface="Arial" panose="020B0604020202020204"/>
-              </a:rPr>
-              <a:t> </a:t>
-            </a:r>
-            <a:r>
-              <a:rPr sz="3600" b="1" spc="5" dirty="0">
-                <a:solidFill>
-                  <a:srgbClr val="9BC850"/>
-                </a:solidFill>
-                <a:latin typeface="Arial" panose="020B0604020202020204"/>
-                <a:cs typeface="Arial" panose="020B0604020202020204"/>
-              </a:rPr>
-              <a:t>app</a:t>
-            </a:r>
-            <a:endParaRPr sz="3600">
-              <a:latin typeface="Arial" panose="020B0604020202020204"/>
-              <a:cs typeface="Arial" panose="020B0604020202020204"/>
-            </a:endParaRPr>
-          </a:p>
-          <a:p>
-            <a:pPr marL="12700">
-              <a:lnSpc>
-                <a:spcPct val="100000"/>
-              </a:lnSpc>
-              <a:spcBef>
-                <a:spcPts val="2785"/>
-              </a:spcBef>
-            </a:pPr>
-            <a:r>
-              <a:rPr sz="3600" b="1" spc="-5" dirty="0">
-                <a:solidFill>
-                  <a:srgbClr val="9BC850"/>
-                </a:solidFill>
-                <a:latin typeface="Arial" panose="020B0604020202020204"/>
-                <a:cs typeface="Arial" panose="020B0604020202020204"/>
-              </a:rPr>
-              <a:t>ng</a:t>
-            </a:r>
-            <a:r>
-              <a:rPr sz="3600" b="1" spc="-75" dirty="0">
-                <a:solidFill>
-                  <a:srgbClr val="9BC850"/>
-                </a:solidFill>
-                <a:latin typeface="Arial" panose="020B0604020202020204"/>
-                <a:cs typeface="Arial" panose="020B0604020202020204"/>
-              </a:rPr>
-              <a:t> </a:t>
-            </a:r>
-            <a:r>
-              <a:rPr sz="3600" b="1" spc="70" dirty="0">
-                <a:solidFill>
-                  <a:srgbClr val="9BC850"/>
-                </a:solidFill>
-                <a:latin typeface="Arial" panose="020B0604020202020204"/>
-                <a:cs typeface="Arial" panose="020B0604020202020204"/>
-              </a:rPr>
-              <a:t>test</a:t>
-            </a:r>
-            <a:r>
-              <a:rPr sz="3600" b="1" spc="-65" dirty="0">
-                <a:solidFill>
-                  <a:srgbClr val="9BC850"/>
-                </a:solidFill>
-                <a:latin typeface="Arial" panose="020B0604020202020204"/>
-                <a:cs typeface="Arial" panose="020B0604020202020204"/>
-              </a:rPr>
-              <a:t> </a:t>
-            </a:r>
-            <a:r>
-              <a:rPr sz="3600" b="1" spc="335" dirty="0">
-                <a:solidFill>
-                  <a:srgbClr val="9BC850"/>
-                </a:solidFill>
-                <a:latin typeface="Arial" panose="020B0604020202020204"/>
-                <a:cs typeface="Arial" panose="020B0604020202020204"/>
-              </a:rPr>
-              <a:t>-</a:t>
-            </a:r>
-            <a:r>
-              <a:rPr sz="3600" b="1" spc="-70" dirty="0">
-                <a:solidFill>
-                  <a:srgbClr val="9BC850"/>
-                </a:solidFill>
-                <a:latin typeface="Arial" panose="020B0604020202020204"/>
-                <a:cs typeface="Arial" panose="020B0604020202020204"/>
-              </a:rPr>
-              <a:t> </a:t>
-            </a:r>
-            <a:r>
-              <a:rPr sz="3600" b="1" spc="-140" dirty="0">
-                <a:solidFill>
-                  <a:srgbClr val="9BC850"/>
-                </a:solidFill>
-                <a:latin typeface="Arial" panose="020B0604020202020204"/>
-                <a:cs typeface="Arial" panose="020B0604020202020204"/>
-              </a:rPr>
-              <a:t>Runs</a:t>
-            </a:r>
-            <a:r>
-              <a:rPr sz="3600" b="1" spc="-65" dirty="0">
-                <a:solidFill>
-                  <a:srgbClr val="9BC850"/>
-                </a:solidFill>
-                <a:latin typeface="Arial" panose="020B0604020202020204"/>
-                <a:cs typeface="Arial" panose="020B0604020202020204"/>
-              </a:rPr>
-              <a:t> </a:t>
-            </a:r>
-            <a:r>
-              <a:rPr sz="3600" b="1" spc="35" dirty="0">
-                <a:solidFill>
-                  <a:srgbClr val="9BC850"/>
-                </a:solidFill>
-                <a:latin typeface="Arial" panose="020B0604020202020204"/>
-                <a:cs typeface="Arial" panose="020B0604020202020204"/>
-              </a:rPr>
-              <a:t>unit</a:t>
-            </a:r>
-            <a:r>
-              <a:rPr sz="3600" b="1" spc="-55" dirty="0">
-                <a:solidFill>
-                  <a:srgbClr val="9BC850"/>
-                </a:solidFill>
-                <a:latin typeface="Arial" panose="020B0604020202020204"/>
-                <a:cs typeface="Arial" panose="020B0604020202020204"/>
-              </a:rPr>
-              <a:t> </a:t>
-            </a:r>
-            <a:r>
-              <a:rPr sz="3600" b="1" spc="-5" dirty="0">
-                <a:solidFill>
-                  <a:srgbClr val="9BC850"/>
-                </a:solidFill>
-                <a:latin typeface="Arial" panose="020B0604020202020204"/>
-                <a:cs typeface="Arial" panose="020B0604020202020204"/>
-              </a:rPr>
-              <a:t>tests</a:t>
-            </a:r>
-            <a:endParaRPr sz="3600">
-              <a:latin typeface="Arial" panose="020B0604020202020204"/>
-              <a:cs typeface="Arial" panose="020B0604020202020204"/>
-            </a:endParaRPr>
-          </a:p>
-          <a:p>
-            <a:pPr marL="12700">
-              <a:lnSpc>
-                <a:spcPct val="100000"/>
-              </a:lnSpc>
-              <a:spcBef>
-                <a:spcPts val="2665"/>
-              </a:spcBef>
-            </a:pPr>
-            <a:r>
-              <a:rPr sz="3600" b="1" spc="-5" dirty="0">
-                <a:solidFill>
-                  <a:srgbClr val="9BC850"/>
-                </a:solidFill>
-                <a:latin typeface="Arial" panose="020B0604020202020204"/>
-                <a:cs typeface="Arial" panose="020B0604020202020204"/>
-              </a:rPr>
-              <a:t>ng</a:t>
-            </a:r>
-            <a:r>
-              <a:rPr sz="3600" b="1" spc="-75" dirty="0">
-                <a:solidFill>
-                  <a:srgbClr val="9BC850"/>
-                </a:solidFill>
-                <a:latin typeface="Arial" panose="020B0604020202020204"/>
-                <a:cs typeface="Arial" panose="020B0604020202020204"/>
-              </a:rPr>
-              <a:t> </a:t>
-            </a:r>
-            <a:r>
-              <a:rPr sz="3600" b="1" spc="110" dirty="0">
-                <a:solidFill>
-                  <a:srgbClr val="9BC850"/>
-                </a:solidFill>
-                <a:latin typeface="Arial" panose="020B0604020202020204"/>
-                <a:cs typeface="Arial" panose="020B0604020202020204"/>
-              </a:rPr>
-              <a:t>e2e</a:t>
-            </a:r>
-            <a:r>
-              <a:rPr sz="3600" b="1" spc="-60" dirty="0">
-                <a:solidFill>
-                  <a:srgbClr val="9BC850"/>
-                </a:solidFill>
-                <a:latin typeface="Arial" panose="020B0604020202020204"/>
-                <a:cs typeface="Arial" panose="020B0604020202020204"/>
-              </a:rPr>
-              <a:t> </a:t>
-            </a:r>
-            <a:r>
-              <a:rPr sz="3600" b="1" spc="335" dirty="0">
-                <a:solidFill>
-                  <a:srgbClr val="9BC850"/>
-                </a:solidFill>
-                <a:latin typeface="Arial" panose="020B0604020202020204"/>
-                <a:cs typeface="Arial" panose="020B0604020202020204"/>
-              </a:rPr>
-              <a:t>-</a:t>
-            </a:r>
-            <a:r>
-              <a:rPr sz="3600" b="1" spc="-70" dirty="0">
-                <a:solidFill>
-                  <a:srgbClr val="9BC850"/>
-                </a:solidFill>
-                <a:latin typeface="Arial" panose="020B0604020202020204"/>
-                <a:cs typeface="Arial" panose="020B0604020202020204"/>
-              </a:rPr>
-              <a:t> </a:t>
-            </a:r>
-            <a:r>
-              <a:rPr sz="3600" b="1" spc="-140" dirty="0">
-                <a:solidFill>
-                  <a:srgbClr val="9BC850"/>
-                </a:solidFill>
-                <a:latin typeface="Arial" panose="020B0604020202020204"/>
-                <a:cs typeface="Arial" panose="020B0604020202020204"/>
-              </a:rPr>
-              <a:t>Runs</a:t>
-            </a:r>
-            <a:r>
-              <a:rPr sz="3600" b="1" spc="-60" dirty="0">
-                <a:solidFill>
-                  <a:srgbClr val="9BC850"/>
-                </a:solidFill>
-                <a:latin typeface="Arial" panose="020B0604020202020204"/>
-                <a:cs typeface="Arial" panose="020B0604020202020204"/>
-              </a:rPr>
-              <a:t> </a:t>
-            </a:r>
-            <a:r>
-              <a:rPr sz="3600" b="1" spc="105" dirty="0">
-                <a:solidFill>
-                  <a:srgbClr val="9BC850"/>
-                </a:solidFill>
-                <a:latin typeface="Arial" panose="020B0604020202020204"/>
-                <a:cs typeface="Arial" panose="020B0604020202020204"/>
-              </a:rPr>
-              <a:t>end-to-end</a:t>
-            </a:r>
-            <a:r>
-              <a:rPr sz="3600" b="1" spc="-70" dirty="0">
-                <a:solidFill>
-                  <a:srgbClr val="9BC850"/>
-                </a:solidFill>
-                <a:latin typeface="Arial" panose="020B0604020202020204"/>
-                <a:cs typeface="Arial" panose="020B0604020202020204"/>
-              </a:rPr>
-              <a:t> </a:t>
-            </a:r>
-            <a:r>
-              <a:rPr sz="3600" b="1" spc="-5" dirty="0">
-                <a:solidFill>
-                  <a:srgbClr val="9BC850"/>
-                </a:solidFill>
-                <a:latin typeface="Arial" panose="020B0604020202020204"/>
-                <a:cs typeface="Arial" panose="020B0604020202020204"/>
-              </a:rPr>
-              <a:t>tests</a:t>
-            </a:r>
-            <a:endParaRPr sz="3600">
-              <a:latin typeface="Arial" panose="020B0604020202020204"/>
-              <a:cs typeface="Arial" panose="020B0604020202020204"/>
-            </a:endParaRPr>
-          </a:p>
-          <a:p>
-            <a:pPr marL="12700" marR="2407920">
-              <a:lnSpc>
-                <a:spcPct val="162000"/>
-              </a:lnSpc>
-            </a:pPr>
-            <a:r>
-              <a:rPr sz="3600" b="1" spc="-5" dirty="0">
-                <a:solidFill>
-                  <a:srgbClr val="9BC850"/>
-                </a:solidFill>
-                <a:latin typeface="Arial" panose="020B0604020202020204"/>
-                <a:cs typeface="Arial" panose="020B0604020202020204"/>
-              </a:rPr>
-              <a:t>ng</a:t>
-            </a:r>
-            <a:r>
-              <a:rPr sz="3600" b="1" spc="-75" dirty="0">
-                <a:solidFill>
-                  <a:srgbClr val="9BC850"/>
-                </a:solidFill>
-                <a:latin typeface="Arial" panose="020B0604020202020204"/>
-                <a:cs typeface="Arial" panose="020B0604020202020204"/>
-              </a:rPr>
-              <a:t> </a:t>
-            </a:r>
-            <a:r>
-              <a:rPr sz="3600" b="1" spc="-20" dirty="0">
-                <a:solidFill>
-                  <a:srgbClr val="9BC850"/>
-                </a:solidFill>
-                <a:latin typeface="Arial" panose="020B0604020202020204"/>
-                <a:cs typeface="Arial" panose="020B0604020202020204"/>
-              </a:rPr>
-              <a:t>build</a:t>
-            </a:r>
-            <a:r>
-              <a:rPr sz="3600" b="1" spc="-60" dirty="0">
-                <a:solidFill>
-                  <a:srgbClr val="9BC850"/>
-                </a:solidFill>
-                <a:latin typeface="Arial" panose="020B0604020202020204"/>
-                <a:cs typeface="Arial" panose="020B0604020202020204"/>
-              </a:rPr>
-              <a:t> </a:t>
-            </a:r>
-            <a:r>
-              <a:rPr sz="3600" b="1" spc="335" dirty="0">
-                <a:solidFill>
-                  <a:srgbClr val="9BC850"/>
-                </a:solidFill>
-                <a:latin typeface="Arial" panose="020B0604020202020204"/>
-                <a:cs typeface="Arial" panose="020B0604020202020204"/>
-              </a:rPr>
-              <a:t>-</a:t>
-            </a:r>
-            <a:r>
-              <a:rPr sz="3600" b="1" spc="-70" dirty="0">
-                <a:solidFill>
-                  <a:srgbClr val="9BC850"/>
-                </a:solidFill>
-                <a:latin typeface="Arial" panose="020B0604020202020204"/>
-                <a:cs typeface="Arial" panose="020B0604020202020204"/>
-              </a:rPr>
-              <a:t> </a:t>
-            </a:r>
-            <a:r>
-              <a:rPr sz="3600" b="1" spc="-40" dirty="0">
-                <a:solidFill>
-                  <a:srgbClr val="9BC850"/>
-                </a:solidFill>
-                <a:latin typeface="Arial" panose="020B0604020202020204"/>
-                <a:cs typeface="Arial" panose="020B0604020202020204"/>
-              </a:rPr>
-              <a:t>Compiles</a:t>
-            </a:r>
-            <a:r>
-              <a:rPr sz="3600" b="1" spc="-60" dirty="0">
-                <a:solidFill>
-                  <a:srgbClr val="9BC850"/>
-                </a:solidFill>
-                <a:latin typeface="Arial" panose="020B0604020202020204"/>
-                <a:cs typeface="Arial" panose="020B0604020202020204"/>
-              </a:rPr>
-              <a:t> </a:t>
-            </a:r>
-            <a:r>
-              <a:rPr sz="3600" b="1" spc="20" dirty="0">
-                <a:solidFill>
-                  <a:srgbClr val="9BC850"/>
-                </a:solidFill>
-                <a:latin typeface="Arial" panose="020B0604020202020204"/>
-                <a:cs typeface="Arial" panose="020B0604020202020204"/>
-              </a:rPr>
-              <a:t>into</a:t>
-            </a:r>
-            <a:r>
-              <a:rPr sz="3600" b="1" spc="-70" dirty="0">
-                <a:solidFill>
-                  <a:srgbClr val="9BC850"/>
-                </a:solidFill>
-                <a:latin typeface="Arial" panose="020B0604020202020204"/>
-                <a:cs typeface="Arial" panose="020B0604020202020204"/>
-              </a:rPr>
-              <a:t> </a:t>
-            </a:r>
-            <a:r>
-              <a:rPr sz="3600" b="1" spc="-25" dirty="0">
-                <a:solidFill>
-                  <a:srgbClr val="9BC850"/>
-                </a:solidFill>
-                <a:latin typeface="Arial" panose="020B0604020202020204"/>
-                <a:cs typeface="Arial" panose="020B0604020202020204"/>
-              </a:rPr>
-              <a:t>an</a:t>
-            </a:r>
-            <a:r>
-              <a:rPr sz="3600" b="1" spc="-60" dirty="0">
-                <a:solidFill>
-                  <a:srgbClr val="9BC850"/>
-                </a:solidFill>
-                <a:latin typeface="Arial" panose="020B0604020202020204"/>
-                <a:cs typeface="Arial" panose="020B0604020202020204"/>
-              </a:rPr>
-              <a:t> </a:t>
-            </a:r>
-            <a:r>
-              <a:rPr sz="3600" b="1" spc="75" dirty="0">
-                <a:solidFill>
-                  <a:srgbClr val="9BC850"/>
-                </a:solidFill>
-                <a:latin typeface="Arial" panose="020B0604020202020204"/>
-                <a:cs typeface="Arial" panose="020B0604020202020204"/>
-              </a:rPr>
-              <a:t>output</a:t>
-            </a:r>
-            <a:r>
-              <a:rPr sz="3600" b="1" spc="-60" dirty="0">
-                <a:solidFill>
-                  <a:srgbClr val="9BC850"/>
-                </a:solidFill>
-                <a:latin typeface="Arial" panose="020B0604020202020204"/>
-                <a:cs typeface="Arial" panose="020B0604020202020204"/>
-              </a:rPr>
-              <a:t> </a:t>
-            </a:r>
-            <a:r>
-              <a:rPr sz="3600" b="1" spc="15" dirty="0">
-                <a:solidFill>
-                  <a:srgbClr val="9BC850"/>
-                </a:solidFill>
-                <a:latin typeface="Arial" panose="020B0604020202020204"/>
-                <a:cs typeface="Arial" panose="020B0604020202020204"/>
-              </a:rPr>
-              <a:t>directory </a:t>
-            </a:r>
-            <a:r>
-              <a:rPr sz="3600" b="1" spc="-990" dirty="0">
-                <a:solidFill>
-                  <a:srgbClr val="9BC850"/>
-                </a:solidFill>
-                <a:latin typeface="Arial" panose="020B0604020202020204"/>
-                <a:cs typeface="Arial" panose="020B0604020202020204"/>
-              </a:rPr>
-              <a:t> </a:t>
-            </a:r>
-            <a:r>
-              <a:rPr sz="3600" b="1" spc="-5" dirty="0">
-                <a:solidFill>
-                  <a:srgbClr val="9BC850"/>
-                </a:solidFill>
-                <a:latin typeface="Arial" panose="020B0604020202020204"/>
-                <a:cs typeface="Arial" panose="020B0604020202020204"/>
-              </a:rPr>
-              <a:t>ng</a:t>
-            </a:r>
-            <a:r>
-              <a:rPr sz="3600" b="1" spc="-75" dirty="0">
-                <a:solidFill>
-                  <a:srgbClr val="9BC850"/>
-                </a:solidFill>
-                <a:latin typeface="Arial" panose="020B0604020202020204"/>
-                <a:cs typeface="Arial" panose="020B0604020202020204"/>
-              </a:rPr>
-              <a:t> </a:t>
-            </a:r>
-            <a:r>
-              <a:rPr sz="3600" b="1" dirty="0">
-                <a:solidFill>
-                  <a:srgbClr val="9BC850"/>
-                </a:solidFill>
-                <a:latin typeface="Arial" panose="020B0604020202020204"/>
-                <a:cs typeface="Arial" panose="020B0604020202020204"/>
-              </a:rPr>
-              <a:t>deploy</a:t>
-            </a:r>
-            <a:r>
-              <a:rPr sz="3600" b="1" spc="-65" dirty="0">
-                <a:solidFill>
-                  <a:srgbClr val="9BC850"/>
-                </a:solidFill>
-                <a:latin typeface="Arial" panose="020B0604020202020204"/>
-                <a:cs typeface="Arial" panose="020B0604020202020204"/>
-              </a:rPr>
-              <a:t> </a:t>
-            </a:r>
-            <a:r>
-              <a:rPr sz="3600" b="1" spc="335" dirty="0">
-                <a:solidFill>
-                  <a:srgbClr val="9BC850"/>
-                </a:solidFill>
-                <a:latin typeface="Arial" panose="020B0604020202020204"/>
-                <a:cs typeface="Arial" panose="020B0604020202020204"/>
-              </a:rPr>
-              <a:t>-</a:t>
-            </a:r>
-            <a:r>
-              <a:rPr sz="3600" b="1" spc="-65" dirty="0">
-                <a:solidFill>
-                  <a:srgbClr val="9BC850"/>
-                </a:solidFill>
-                <a:latin typeface="Arial" panose="020B0604020202020204"/>
-                <a:cs typeface="Arial" panose="020B0604020202020204"/>
-              </a:rPr>
-              <a:t> </a:t>
-            </a:r>
-            <a:r>
-              <a:rPr sz="3600" b="1" spc="-55" dirty="0">
-                <a:solidFill>
-                  <a:srgbClr val="9BC850"/>
-                </a:solidFill>
-                <a:latin typeface="Arial" panose="020B0604020202020204"/>
-                <a:cs typeface="Arial" panose="020B0604020202020204"/>
-              </a:rPr>
-              <a:t>Deploys</a:t>
-            </a:r>
-            <a:r>
-              <a:rPr sz="3600" b="1" spc="-60" dirty="0">
-                <a:solidFill>
-                  <a:srgbClr val="9BC850"/>
-                </a:solidFill>
-                <a:latin typeface="Arial" panose="020B0604020202020204"/>
-                <a:cs typeface="Arial" panose="020B0604020202020204"/>
-              </a:rPr>
-              <a:t> </a:t>
-            </a:r>
-            <a:r>
-              <a:rPr sz="3600" b="1" spc="110" dirty="0">
-                <a:solidFill>
-                  <a:srgbClr val="9BC850"/>
-                </a:solidFill>
-                <a:latin typeface="Arial" panose="020B0604020202020204"/>
-                <a:cs typeface="Arial" panose="020B0604020202020204"/>
-              </a:rPr>
-              <a:t>the</a:t>
-            </a:r>
-            <a:r>
-              <a:rPr sz="3600" b="1" spc="-60" dirty="0">
-                <a:solidFill>
-                  <a:srgbClr val="9BC850"/>
-                </a:solidFill>
-                <a:latin typeface="Arial" panose="020B0604020202020204"/>
-                <a:cs typeface="Arial" panose="020B0604020202020204"/>
-              </a:rPr>
-              <a:t> </a:t>
-            </a:r>
-            <a:r>
-              <a:rPr sz="3600" b="1" spc="-5" dirty="0">
-                <a:solidFill>
-                  <a:srgbClr val="9BC850"/>
-                </a:solidFill>
-                <a:latin typeface="Arial" panose="020B0604020202020204"/>
-                <a:cs typeface="Arial" panose="020B0604020202020204"/>
-              </a:rPr>
-              <a:t>application</a:t>
-            </a:r>
-            <a:endParaRPr sz="3600">
-              <a:latin typeface="Arial" panose="020B0604020202020204"/>
-              <a:cs typeface="Arial" panose="020B0604020202020204"/>
-            </a:endParaRPr>
-          </a:p>
-          <a:p>
-            <a:pPr marL="12700">
-              <a:lnSpc>
-                <a:spcPct val="100000"/>
-              </a:lnSpc>
-              <a:spcBef>
-                <a:spcPts val="2665"/>
-              </a:spcBef>
-            </a:pPr>
-            <a:r>
-              <a:rPr sz="3600" b="1" spc="-5" dirty="0">
-                <a:solidFill>
-                  <a:srgbClr val="9BC850"/>
-                </a:solidFill>
-                <a:latin typeface="Arial" panose="020B0604020202020204"/>
-                <a:cs typeface="Arial" panose="020B0604020202020204"/>
-              </a:rPr>
-              <a:t>ng</a:t>
-            </a:r>
-            <a:r>
-              <a:rPr sz="3600" b="1" spc="-70" dirty="0">
-                <a:solidFill>
-                  <a:srgbClr val="9BC850"/>
-                </a:solidFill>
-                <a:latin typeface="Arial" panose="020B0604020202020204"/>
-                <a:cs typeface="Arial" panose="020B0604020202020204"/>
-              </a:rPr>
-              <a:t> </a:t>
-            </a:r>
-            <a:r>
-              <a:rPr sz="3600" b="1" spc="45" dirty="0">
-                <a:solidFill>
-                  <a:srgbClr val="9BC850"/>
-                </a:solidFill>
-                <a:latin typeface="Arial" panose="020B0604020202020204"/>
-                <a:cs typeface="Arial" panose="020B0604020202020204"/>
-              </a:rPr>
-              <a:t>update</a:t>
-            </a:r>
-            <a:r>
-              <a:rPr sz="3600" b="1" spc="-55" dirty="0">
-                <a:solidFill>
-                  <a:srgbClr val="9BC850"/>
-                </a:solidFill>
-                <a:latin typeface="Arial" panose="020B0604020202020204"/>
-                <a:cs typeface="Arial" panose="020B0604020202020204"/>
-              </a:rPr>
-              <a:t> </a:t>
-            </a:r>
-            <a:r>
-              <a:rPr sz="3600" b="1" spc="335" dirty="0">
-                <a:solidFill>
-                  <a:srgbClr val="9BC850"/>
-                </a:solidFill>
-                <a:latin typeface="Arial" panose="020B0604020202020204"/>
-                <a:cs typeface="Arial" panose="020B0604020202020204"/>
-              </a:rPr>
-              <a:t>-</a:t>
-            </a:r>
-            <a:r>
-              <a:rPr sz="3600" b="1" spc="-65" dirty="0">
-                <a:solidFill>
-                  <a:srgbClr val="9BC850"/>
-                </a:solidFill>
-                <a:latin typeface="Arial" panose="020B0604020202020204"/>
-                <a:cs typeface="Arial" panose="020B0604020202020204"/>
-              </a:rPr>
-              <a:t> </a:t>
-            </a:r>
-            <a:r>
-              <a:rPr sz="3600" b="1" dirty="0">
-                <a:solidFill>
-                  <a:srgbClr val="9BC850"/>
-                </a:solidFill>
-                <a:latin typeface="Arial" panose="020B0604020202020204"/>
-                <a:cs typeface="Arial" panose="020B0604020202020204"/>
-              </a:rPr>
-              <a:t>Updates</a:t>
-            </a:r>
-            <a:r>
-              <a:rPr sz="3600" b="1" spc="-60" dirty="0">
-                <a:solidFill>
-                  <a:srgbClr val="9BC850"/>
-                </a:solidFill>
-                <a:latin typeface="Arial" panose="020B0604020202020204"/>
-                <a:cs typeface="Arial" panose="020B0604020202020204"/>
-              </a:rPr>
-              <a:t> </a:t>
-            </a:r>
-            <a:r>
-              <a:rPr sz="3600" b="1" spc="110" dirty="0">
-                <a:solidFill>
-                  <a:srgbClr val="9BC850"/>
-                </a:solidFill>
-                <a:latin typeface="Arial" panose="020B0604020202020204"/>
-                <a:cs typeface="Arial" panose="020B0604020202020204"/>
-              </a:rPr>
-              <a:t>the</a:t>
-            </a:r>
-            <a:r>
-              <a:rPr sz="3600" b="1" spc="-60" dirty="0">
-                <a:solidFill>
-                  <a:srgbClr val="9BC850"/>
-                </a:solidFill>
-                <a:latin typeface="Arial" panose="020B0604020202020204"/>
-                <a:cs typeface="Arial" panose="020B0604020202020204"/>
-              </a:rPr>
-              <a:t> Angular </a:t>
-            </a:r>
-            <a:r>
-              <a:rPr sz="3600" b="1" spc="-55" dirty="0">
-                <a:solidFill>
-                  <a:srgbClr val="9BC850"/>
-                </a:solidFill>
-                <a:latin typeface="Arial" panose="020B0604020202020204"/>
-                <a:cs typeface="Arial" panose="020B0604020202020204"/>
-              </a:rPr>
-              <a:t>version</a:t>
-            </a:r>
-            <a:r>
-              <a:rPr sz="3600" b="1" spc="-60" dirty="0">
-                <a:solidFill>
-                  <a:srgbClr val="9BC850"/>
-                </a:solidFill>
-                <a:latin typeface="Arial" panose="020B0604020202020204"/>
-                <a:cs typeface="Arial" panose="020B0604020202020204"/>
-              </a:rPr>
-              <a:t> </a:t>
-            </a:r>
-            <a:r>
-              <a:rPr sz="3600" b="1" spc="-10" dirty="0">
-                <a:solidFill>
-                  <a:srgbClr val="9BC850"/>
-                </a:solidFill>
-                <a:latin typeface="Arial" panose="020B0604020202020204"/>
-                <a:cs typeface="Arial" panose="020B0604020202020204"/>
-              </a:rPr>
-              <a:t>for</a:t>
-            </a:r>
-            <a:r>
-              <a:rPr sz="3600" b="1" spc="-65" dirty="0">
-                <a:solidFill>
-                  <a:srgbClr val="9BC850"/>
-                </a:solidFill>
-                <a:latin typeface="Arial" panose="020B0604020202020204"/>
-                <a:cs typeface="Arial" panose="020B0604020202020204"/>
-              </a:rPr>
-              <a:t> </a:t>
-            </a:r>
-            <a:r>
-              <a:rPr sz="3600" b="1" spc="110" dirty="0">
-                <a:solidFill>
-                  <a:srgbClr val="9BC850"/>
-                </a:solidFill>
-                <a:latin typeface="Arial" panose="020B0604020202020204"/>
-                <a:cs typeface="Arial" panose="020B0604020202020204"/>
-              </a:rPr>
-              <a:t>the</a:t>
-            </a:r>
-            <a:r>
-              <a:rPr sz="3600" b="1" spc="-60" dirty="0">
-                <a:solidFill>
-                  <a:srgbClr val="9BC850"/>
-                </a:solidFill>
-                <a:latin typeface="Arial" panose="020B0604020202020204"/>
-                <a:cs typeface="Arial" panose="020B0604020202020204"/>
-              </a:rPr>
-              <a:t> </a:t>
-            </a:r>
-            <a:r>
-              <a:rPr sz="3600" b="1" spc="5" dirty="0">
-                <a:solidFill>
-                  <a:srgbClr val="9BC850"/>
-                </a:solidFill>
-                <a:latin typeface="Arial" panose="020B0604020202020204"/>
-                <a:cs typeface="Arial" panose="020B0604020202020204"/>
-              </a:rPr>
-              <a:t>app</a:t>
-            </a:r>
-            <a:endParaRPr sz="3600">
-              <a:latin typeface="Arial" panose="020B0604020202020204"/>
-              <a:cs typeface="Arial" panose="020B0604020202020204"/>
-            </a:endParaRPr>
-          </a:p>
-        </p:txBody>
-      </p:sp>
-      <p:sp>
-        <p:nvSpPr>
-          <p:cNvPr id="9" name="Slide Number Placeholder 8"/>
-          <p:cNvSpPr>
-            <a:spLocks noGrp="1"/>
-          </p:cNvSpPr>
-          <p:nvPr>
-            <p:ph type="sldNum" sz="quarter" idx="7"/>
-          </p:nvPr>
-        </p:nvSpPr>
-        <p:spPr/>
-        <p:txBody>
-          <a:bodyPr/>
-          <a:p>
-            <a:fld id="{B6F15528-21DE-4FAA-801E-634DDDAF4B2B}" type="slidenum">
-              <a:rPr/>
-            </a:fld>
-            <a:endParaRPr/>
-          </a:p>
-        </p:txBody>
-      </p:sp>
-    </p:spTree>
-  </p:cSld>
-  <p:clrMapOvr>
-    <a:masterClrMapping/>
-  </p:clrMapOvr>
-</p:sld>
-</file>
-
-<file path=ppt/slides/slide26.xml><?xml version="1.0" encoding="utf-8"?>
-<p:sld xmlns:a="http://schemas.openxmlformats.org/drawingml/2006/main" xmlns:r="http://schemas.openxmlformats.org/officeDocument/2006/relationships" xmlns:p="http://schemas.openxmlformats.org/presentationml/2006/main" showMasterSp="0">
-  <p:cSld>
-    <p:spTree>
-      <p:nvGrpSpPr>
-        <p:cNvPr id="1" name=""/>
-        <p:cNvGrpSpPr/>
-        <p:nvPr/>
-      </p:nvGrpSpPr>
-      <p:grpSpPr>
-        <a:xfrm>
-          <a:off x="0" y="0"/>
-          <a:ext cx="0" cy="0"/>
-          <a:chOff x="0" y="0"/>
-          <a:chExt cx="0" cy="0"/>
-        </a:xfrm>
-      </p:grpSpPr>
-      <p:grpSp>
-        <p:nvGrpSpPr>
-          <p:cNvPr id="2" name="object 2"/>
-          <p:cNvGrpSpPr/>
-          <p:nvPr/>
-        </p:nvGrpSpPr>
-        <p:grpSpPr>
-          <a:xfrm>
-            <a:off x="0" y="0"/>
-            <a:ext cx="3657600" cy="10287000"/>
-            <a:chOff x="0" y="0"/>
-            <a:chExt cx="3657600" cy="10287000"/>
-          </a:xfrm>
-        </p:grpSpPr>
-        <p:sp>
-          <p:nvSpPr>
-            <p:cNvPr id="3" name="object 3"/>
-            <p:cNvSpPr/>
-            <p:nvPr/>
-          </p:nvSpPr>
-          <p:spPr>
-            <a:xfrm>
-              <a:off x="0" y="0"/>
-              <a:ext cx="3657600" cy="10287000"/>
-            </a:xfrm>
-            <a:custGeom>
-              <a:avLst/>
-              <a:gdLst/>
-              <a:ahLst/>
-              <a:cxnLst/>
-              <a:rect l="l" t="t" r="r" b="b"/>
-              <a:pathLst>
-                <a:path w="3657600" h="10287000">
-                  <a:moveTo>
-                    <a:pt x="3657600" y="0"/>
-                  </a:moveTo>
-                  <a:lnTo>
-                    <a:pt x="0" y="0"/>
-                  </a:lnTo>
-                  <a:lnTo>
-                    <a:pt x="0" y="10286999"/>
-                  </a:lnTo>
-                  <a:lnTo>
-                    <a:pt x="3657600" y="10286999"/>
-                  </a:lnTo>
-                  <a:lnTo>
-                    <a:pt x="3657600" y="0"/>
-                  </a:lnTo>
-                  <a:close/>
-                </a:path>
-              </a:pathLst>
-            </a:custGeom>
-            <a:solidFill>
-              <a:srgbClr val="9BC850"/>
-            </a:solidFill>
-          </p:spPr>
-          <p:txBody>
-            <a:bodyPr wrap="square" lIns="0" tIns="0" rIns="0" bIns="0" rtlCol="0"/>
-            <a:lstStyle/>
-            <a:p/>
-          </p:txBody>
-        </p:sp>
-        <p:sp>
-          <p:nvSpPr>
-            <p:cNvPr id="4" name="object 4"/>
-            <p:cNvSpPr/>
-            <p:nvPr/>
-          </p:nvSpPr>
-          <p:spPr>
-            <a:xfrm>
-              <a:off x="320736" y="4016010"/>
-              <a:ext cx="2689225" cy="2255520"/>
-            </a:xfrm>
-            <a:custGeom>
-              <a:avLst/>
-              <a:gdLst/>
-              <a:ahLst/>
-              <a:cxnLst/>
-              <a:rect l="l" t="t" r="r" b="b"/>
-              <a:pathLst>
-                <a:path w="2689225" h="2255520">
-                  <a:moveTo>
-                    <a:pt x="2688950" y="0"/>
-                  </a:moveTo>
-                  <a:lnTo>
-                    <a:pt x="0" y="0"/>
-                  </a:lnTo>
-                  <a:lnTo>
-                    <a:pt x="0" y="2254977"/>
-                  </a:lnTo>
-                  <a:lnTo>
-                    <a:pt x="2688950" y="2254977"/>
-                  </a:lnTo>
-                  <a:lnTo>
-                    <a:pt x="2688950" y="0"/>
-                  </a:lnTo>
-                  <a:close/>
-                </a:path>
-              </a:pathLst>
-            </a:custGeom>
-            <a:solidFill>
-              <a:srgbClr val="FFFFFF"/>
-            </a:solidFill>
-          </p:spPr>
-          <p:txBody>
-            <a:bodyPr wrap="square" lIns="0" tIns="0" rIns="0" bIns="0" rtlCol="0"/>
-            <a:lstStyle/>
-            <a:p/>
-          </p:txBody>
-        </p:sp>
-        <p:sp>
-          <p:nvSpPr>
-            <p:cNvPr id="5" name="object 5"/>
-            <p:cNvSpPr/>
-            <p:nvPr/>
-          </p:nvSpPr>
-          <p:spPr>
-            <a:xfrm>
-              <a:off x="320736" y="4016010"/>
-              <a:ext cx="2689225" cy="2255520"/>
-            </a:xfrm>
-            <a:custGeom>
-              <a:avLst/>
-              <a:gdLst/>
-              <a:ahLst/>
-              <a:cxnLst/>
-              <a:rect l="l" t="t" r="r" b="b"/>
-              <a:pathLst>
-                <a:path w="2689225" h="2255520">
-                  <a:moveTo>
-                    <a:pt x="0" y="0"/>
-                  </a:moveTo>
-                  <a:lnTo>
-                    <a:pt x="2688951" y="0"/>
-                  </a:lnTo>
-                  <a:lnTo>
-                    <a:pt x="2688951" y="2254977"/>
-                  </a:lnTo>
-                  <a:lnTo>
-                    <a:pt x="0" y="2254977"/>
-                  </a:lnTo>
-                  <a:lnTo>
-                    <a:pt x="0" y="0"/>
-                  </a:lnTo>
-                  <a:close/>
-                </a:path>
-              </a:pathLst>
-            </a:custGeom>
-            <a:ln w="50800">
-              <a:solidFill>
-                <a:srgbClr val="9BC850"/>
-              </a:solidFill>
-            </a:ln>
-          </p:spPr>
-          <p:txBody>
-            <a:bodyPr wrap="square" lIns="0" tIns="0" rIns="0" bIns="0" rtlCol="0"/>
-            <a:lstStyle/>
-            <a:p/>
-          </p:txBody>
-        </p:sp>
-        <p:pic>
-          <p:nvPicPr>
-            <p:cNvPr id="6" name="object 6"/>
-            <p:cNvPicPr/>
-            <p:nvPr/>
-          </p:nvPicPr>
-          <p:blipFill>
-            <a:blip r:embed="rId1" cstate="print"/>
-            <a:stretch>
-              <a:fillRect/>
-            </a:stretch>
-          </p:blipFill>
-          <p:spPr>
-            <a:xfrm>
-              <a:off x="729004" y="4411124"/>
-              <a:ext cx="1872414" cy="1464749"/>
-            </a:xfrm>
-            <a:prstGeom prst="rect">
-              <a:avLst/>
-            </a:prstGeom>
-          </p:spPr>
-        </p:pic>
-      </p:grpSp>
-      <p:sp>
-        <p:nvSpPr>
-          <p:cNvPr id="7" name="object 7"/>
           <p:cNvSpPr txBox="1"/>
           <p:nvPr/>
         </p:nvSpPr>
@@ -13447,7 +13350,7 @@
 </p:sld>
 </file>
 
-<file path=ppt/slides/slide27.xml><?xml version="1.0" encoding="utf-8"?>
+<file path=ppt/slides/slide26.xml><?xml version="1.0" encoding="utf-8"?>
 <p:sld xmlns:a="http://schemas.openxmlformats.org/drawingml/2006/main" xmlns:r="http://schemas.openxmlformats.org/officeDocument/2006/relationships" xmlns:p="http://schemas.openxmlformats.org/presentationml/2006/main" showMasterSp="0">
   <p:cSld>
     <p:spTree>

</xml_diff>